<commit_message>
done some changes to report
</commit_message>
<xml_diff>
--- a/Report/Web Lab mini project PPT format.pptx
+++ b/Report/Web Lab mini project PPT format.pptx
@@ -5,11 +5,17 @@
     <p:sldMasterId id="2147483648" r:id="rId1"/>
   </p:sldMasterIdLst>
   <p:notesMasterIdLst>
-    <p:notesMasterId r:id="rId4"/>
+    <p:notesMasterId r:id="rId10"/>
   </p:notesMasterIdLst>
   <p:sldIdLst>
     <p:sldId id="256" r:id="rId2"/>
     <p:sldId id="257" r:id="rId3"/>
+    <p:sldId id="259" r:id="rId4"/>
+    <p:sldId id="260" r:id="rId5"/>
+    <p:sldId id="261" r:id="rId6"/>
+    <p:sldId id="262" r:id="rId7"/>
+    <p:sldId id="263" r:id="rId8"/>
+    <p:sldId id="264" r:id="rId9"/>
   </p:sldIdLst>
   <p:sldSz cx="12192000" cy="6858000"/>
   <p:notesSz cx="6858000" cy="9144000"/>
@@ -110,7 +116,7 @@
   </p:defaultTextStyle>
   <p:extLst>
     <p:ext uri="{EFAFB233-063F-42B5-8137-9DF3F51BA10A}">
-      <p15:sldGuideLst xmlns:p15="http://schemas.microsoft.com/office/powerpoint/2012/main" xmlns="">
+      <p15:sldGuideLst xmlns:p15="http://schemas.microsoft.com/office/powerpoint/2012/main">
         <p15:guide id="1" orient="horz" pos="2160">
           <p15:clr>
             <a:srgbClr val="A4A3A4"/>
@@ -501,7 +507,7 @@
           <p:cNvPr id="2" name="Title 1">
             <a:extLst>
               <a:ext uri="{FF2B5EF4-FFF2-40B4-BE49-F238E27FC236}">
-                <a16:creationId xmlns:a16="http://schemas.microsoft.com/office/drawing/2014/main" xmlns="" id="{D8A165E2-C95D-46EA-998A-38DCEF0D67F2}"/>
+                <a16:creationId xmlns:a16="http://schemas.microsoft.com/office/drawing/2014/main" id="{D8A165E2-C95D-46EA-998A-38DCEF0D67F2}"/>
               </a:ext>
             </a:extLst>
           </p:cNvPr>
@@ -539,7 +545,7 @@
           <p:cNvPr id="3" name="Subtitle 2">
             <a:extLst>
               <a:ext uri="{FF2B5EF4-FFF2-40B4-BE49-F238E27FC236}">
-                <a16:creationId xmlns:a16="http://schemas.microsoft.com/office/drawing/2014/main" xmlns="" id="{FBFEE819-928C-4720-A8AA-5AC73647F75E}"/>
+                <a16:creationId xmlns:a16="http://schemas.microsoft.com/office/drawing/2014/main" id="{FBFEE819-928C-4720-A8AA-5AC73647F75E}"/>
               </a:ext>
             </a:extLst>
           </p:cNvPr>
@@ -610,7 +616,7 @@
           <p:cNvPr id="4" name="Date Placeholder 3">
             <a:extLst>
               <a:ext uri="{FF2B5EF4-FFF2-40B4-BE49-F238E27FC236}">
-                <a16:creationId xmlns:a16="http://schemas.microsoft.com/office/drawing/2014/main" xmlns="" id="{D3FA4B8A-0E74-42F4-A053-96A2D8441898}"/>
+                <a16:creationId xmlns:a16="http://schemas.microsoft.com/office/drawing/2014/main" id="{D3FA4B8A-0E74-42F4-A053-96A2D8441898}"/>
               </a:ext>
             </a:extLst>
           </p:cNvPr>
@@ -640,7 +646,7 @@
           <p:cNvPr id="5" name="Footer Placeholder 4">
             <a:extLst>
               <a:ext uri="{FF2B5EF4-FFF2-40B4-BE49-F238E27FC236}">
-                <a16:creationId xmlns:a16="http://schemas.microsoft.com/office/drawing/2014/main" xmlns="" id="{3EE71C71-D8FD-4939-994D-84477E7D9D1A}"/>
+                <a16:creationId xmlns:a16="http://schemas.microsoft.com/office/drawing/2014/main" id="{3EE71C71-D8FD-4939-994D-84477E7D9D1A}"/>
               </a:ext>
             </a:extLst>
           </p:cNvPr>
@@ -668,7 +674,7 @@
           <p:cNvPr id="6" name="Slide Number Placeholder 5">
             <a:extLst>
               <a:ext uri="{FF2B5EF4-FFF2-40B4-BE49-F238E27FC236}">
-                <a16:creationId xmlns:a16="http://schemas.microsoft.com/office/drawing/2014/main" xmlns="" id="{007C00BF-6BED-432C-9037-5D56FFCE4FE6}"/>
+                <a16:creationId xmlns:a16="http://schemas.microsoft.com/office/drawing/2014/main" id="{007C00BF-6BED-432C-9037-5D56FFCE4FE6}"/>
               </a:ext>
             </a:extLst>
           </p:cNvPr>
@@ -728,7 +734,7 @@
           <p:cNvPr id="2" name="Title 1">
             <a:extLst>
               <a:ext uri="{FF2B5EF4-FFF2-40B4-BE49-F238E27FC236}">
-                <a16:creationId xmlns:a16="http://schemas.microsoft.com/office/drawing/2014/main" xmlns="" id="{5F64E18C-8BD3-42B4-9F0B-B610C4FC587A}"/>
+                <a16:creationId xmlns:a16="http://schemas.microsoft.com/office/drawing/2014/main" id="{5F64E18C-8BD3-42B4-9F0B-B610C4FC587A}"/>
               </a:ext>
             </a:extLst>
           </p:cNvPr>
@@ -757,7 +763,7 @@
           <p:cNvPr id="3" name="Vertical Text Placeholder 2">
             <a:extLst>
               <a:ext uri="{FF2B5EF4-FFF2-40B4-BE49-F238E27FC236}">
-                <a16:creationId xmlns:a16="http://schemas.microsoft.com/office/drawing/2014/main" xmlns="" id="{5787E2DC-2260-4096-9B2B-D248E6CCC02C}"/>
+                <a16:creationId xmlns:a16="http://schemas.microsoft.com/office/drawing/2014/main" id="{5787E2DC-2260-4096-9B2B-D248E6CCC02C}"/>
               </a:ext>
             </a:extLst>
           </p:cNvPr>
@@ -815,7 +821,7 @@
           <p:cNvPr id="4" name="Date Placeholder 3">
             <a:extLst>
               <a:ext uri="{FF2B5EF4-FFF2-40B4-BE49-F238E27FC236}">
-                <a16:creationId xmlns:a16="http://schemas.microsoft.com/office/drawing/2014/main" xmlns="" id="{02DD32D5-0297-41A7-B9FC-F69982C13168}"/>
+                <a16:creationId xmlns:a16="http://schemas.microsoft.com/office/drawing/2014/main" id="{02DD32D5-0297-41A7-B9FC-F69982C13168}"/>
               </a:ext>
             </a:extLst>
           </p:cNvPr>
@@ -845,7 +851,7 @@
           <p:cNvPr id="5" name="Footer Placeholder 4">
             <a:extLst>
               <a:ext uri="{FF2B5EF4-FFF2-40B4-BE49-F238E27FC236}">
-                <a16:creationId xmlns:a16="http://schemas.microsoft.com/office/drawing/2014/main" xmlns="" id="{AB2F45B9-EA2C-4054-8820-FCADCEE81296}"/>
+                <a16:creationId xmlns:a16="http://schemas.microsoft.com/office/drawing/2014/main" id="{AB2F45B9-EA2C-4054-8820-FCADCEE81296}"/>
               </a:ext>
             </a:extLst>
           </p:cNvPr>
@@ -873,7 +879,7 @@
           <p:cNvPr id="6" name="Slide Number Placeholder 5">
             <a:extLst>
               <a:ext uri="{FF2B5EF4-FFF2-40B4-BE49-F238E27FC236}">
-                <a16:creationId xmlns:a16="http://schemas.microsoft.com/office/drawing/2014/main" xmlns="" id="{AE91BFEC-6A34-447C-A016-DCD1C22DD97A}"/>
+                <a16:creationId xmlns:a16="http://schemas.microsoft.com/office/drawing/2014/main" id="{AE91BFEC-6A34-447C-A016-DCD1C22DD97A}"/>
               </a:ext>
             </a:extLst>
           </p:cNvPr>
@@ -933,7 +939,7 @@
           <p:cNvPr id="2" name="Vertical Title 1">
             <a:extLst>
               <a:ext uri="{FF2B5EF4-FFF2-40B4-BE49-F238E27FC236}">
-                <a16:creationId xmlns:a16="http://schemas.microsoft.com/office/drawing/2014/main" xmlns="" id="{4F43E80D-37D0-4A81-80CD-37785DE6A58E}"/>
+                <a16:creationId xmlns:a16="http://schemas.microsoft.com/office/drawing/2014/main" id="{4F43E80D-37D0-4A81-80CD-37785DE6A58E}"/>
               </a:ext>
             </a:extLst>
           </p:cNvPr>
@@ -967,7 +973,7 @@
           <p:cNvPr id="3" name="Vertical Text Placeholder 2">
             <a:extLst>
               <a:ext uri="{FF2B5EF4-FFF2-40B4-BE49-F238E27FC236}">
-                <a16:creationId xmlns:a16="http://schemas.microsoft.com/office/drawing/2014/main" xmlns="" id="{5EF62143-E21D-482E-A06D-6F37E88FF8DE}"/>
+                <a16:creationId xmlns:a16="http://schemas.microsoft.com/office/drawing/2014/main" id="{5EF62143-E21D-482E-A06D-6F37E88FF8DE}"/>
               </a:ext>
             </a:extLst>
           </p:cNvPr>
@@ -1030,7 +1036,7 @@
           <p:cNvPr id="4" name="Date Placeholder 3">
             <a:extLst>
               <a:ext uri="{FF2B5EF4-FFF2-40B4-BE49-F238E27FC236}">
-                <a16:creationId xmlns:a16="http://schemas.microsoft.com/office/drawing/2014/main" xmlns="" id="{B77BBA52-FF62-40F5-81B6-DBD727EB0A82}"/>
+                <a16:creationId xmlns:a16="http://schemas.microsoft.com/office/drawing/2014/main" id="{B77BBA52-FF62-40F5-81B6-DBD727EB0A82}"/>
               </a:ext>
             </a:extLst>
           </p:cNvPr>
@@ -1060,7 +1066,7 @@
           <p:cNvPr id="5" name="Footer Placeholder 4">
             <a:extLst>
               <a:ext uri="{FF2B5EF4-FFF2-40B4-BE49-F238E27FC236}">
-                <a16:creationId xmlns:a16="http://schemas.microsoft.com/office/drawing/2014/main" xmlns="" id="{BB2CDE25-2BBD-4C93-A912-D0062858D10D}"/>
+                <a16:creationId xmlns:a16="http://schemas.microsoft.com/office/drawing/2014/main" id="{BB2CDE25-2BBD-4C93-A912-D0062858D10D}"/>
               </a:ext>
             </a:extLst>
           </p:cNvPr>
@@ -1088,7 +1094,7 @@
           <p:cNvPr id="6" name="Slide Number Placeholder 5">
             <a:extLst>
               <a:ext uri="{FF2B5EF4-FFF2-40B4-BE49-F238E27FC236}">
-                <a16:creationId xmlns:a16="http://schemas.microsoft.com/office/drawing/2014/main" xmlns="" id="{BD0FCA15-45B3-493F-B198-49B81A80B971}"/>
+                <a16:creationId xmlns:a16="http://schemas.microsoft.com/office/drawing/2014/main" id="{BD0FCA15-45B3-493F-B198-49B81A80B971}"/>
               </a:ext>
             </a:extLst>
           </p:cNvPr>
@@ -1148,7 +1154,7 @@
           <p:cNvPr id="2" name="Title 1">
             <a:extLst>
               <a:ext uri="{FF2B5EF4-FFF2-40B4-BE49-F238E27FC236}">
-                <a16:creationId xmlns:a16="http://schemas.microsoft.com/office/drawing/2014/main" xmlns="" id="{0D7C1AEB-4D59-402D-9A56-1B4F30A51CE8}"/>
+                <a16:creationId xmlns:a16="http://schemas.microsoft.com/office/drawing/2014/main" id="{0D7C1AEB-4D59-402D-9A56-1B4F30A51CE8}"/>
               </a:ext>
             </a:extLst>
           </p:cNvPr>
@@ -1177,7 +1183,7 @@
           <p:cNvPr id="3" name="Content Placeholder 2">
             <a:extLst>
               <a:ext uri="{FF2B5EF4-FFF2-40B4-BE49-F238E27FC236}">
-                <a16:creationId xmlns:a16="http://schemas.microsoft.com/office/drawing/2014/main" xmlns="" id="{E2FDBC9B-2FB3-4BE4-A7DA-4FDC5836C156}"/>
+                <a16:creationId xmlns:a16="http://schemas.microsoft.com/office/drawing/2014/main" id="{E2FDBC9B-2FB3-4BE4-A7DA-4FDC5836C156}"/>
               </a:ext>
             </a:extLst>
           </p:cNvPr>
@@ -1235,7 +1241,7 @@
           <p:cNvPr id="4" name="Date Placeholder 3">
             <a:extLst>
               <a:ext uri="{FF2B5EF4-FFF2-40B4-BE49-F238E27FC236}">
-                <a16:creationId xmlns:a16="http://schemas.microsoft.com/office/drawing/2014/main" xmlns="" id="{9A4FCF0A-82B5-4BBA-8870-DEB7789B60E1}"/>
+                <a16:creationId xmlns:a16="http://schemas.microsoft.com/office/drawing/2014/main" id="{9A4FCF0A-82B5-4BBA-8870-DEB7789B60E1}"/>
               </a:ext>
             </a:extLst>
           </p:cNvPr>
@@ -1265,7 +1271,7 @@
           <p:cNvPr id="5" name="Footer Placeholder 4">
             <a:extLst>
               <a:ext uri="{FF2B5EF4-FFF2-40B4-BE49-F238E27FC236}">
-                <a16:creationId xmlns:a16="http://schemas.microsoft.com/office/drawing/2014/main" xmlns="" id="{88ACC5C7-5A5D-4CE1-8700-29AC9D851E95}"/>
+                <a16:creationId xmlns:a16="http://schemas.microsoft.com/office/drawing/2014/main" id="{88ACC5C7-5A5D-4CE1-8700-29AC9D851E95}"/>
               </a:ext>
             </a:extLst>
           </p:cNvPr>
@@ -1293,7 +1299,7 @@
           <p:cNvPr id="6" name="Slide Number Placeholder 5">
             <a:extLst>
               <a:ext uri="{FF2B5EF4-FFF2-40B4-BE49-F238E27FC236}">
-                <a16:creationId xmlns:a16="http://schemas.microsoft.com/office/drawing/2014/main" xmlns="" id="{E17B619E-DE02-4C3F-ADC5-8F4B437C60FE}"/>
+                <a16:creationId xmlns:a16="http://schemas.microsoft.com/office/drawing/2014/main" id="{E17B619E-DE02-4C3F-ADC5-8F4B437C60FE}"/>
               </a:ext>
             </a:extLst>
           </p:cNvPr>
@@ -1353,7 +1359,7 @@
           <p:cNvPr id="2" name="Title 1">
             <a:extLst>
               <a:ext uri="{FF2B5EF4-FFF2-40B4-BE49-F238E27FC236}">
-                <a16:creationId xmlns:a16="http://schemas.microsoft.com/office/drawing/2014/main" xmlns="" id="{590C7B8B-A95E-44F4-98E3-52A4CC934EE9}"/>
+                <a16:creationId xmlns:a16="http://schemas.microsoft.com/office/drawing/2014/main" id="{590C7B8B-A95E-44F4-98E3-52A4CC934EE9}"/>
               </a:ext>
             </a:extLst>
           </p:cNvPr>
@@ -1391,7 +1397,7 @@
           <p:cNvPr id="3" name="Text Placeholder 2">
             <a:extLst>
               <a:ext uri="{FF2B5EF4-FFF2-40B4-BE49-F238E27FC236}">
-                <a16:creationId xmlns:a16="http://schemas.microsoft.com/office/drawing/2014/main" xmlns="" id="{2FD86949-633E-495F-A44C-F1DD1F62EEBA}"/>
+                <a16:creationId xmlns:a16="http://schemas.microsoft.com/office/drawing/2014/main" id="{2FD86949-633E-495F-A44C-F1DD1F62EEBA}"/>
               </a:ext>
             </a:extLst>
           </p:cNvPr>
@@ -1516,7 +1522,7 @@
           <p:cNvPr id="4" name="Date Placeholder 3">
             <a:extLst>
               <a:ext uri="{FF2B5EF4-FFF2-40B4-BE49-F238E27FC236}">
-                <a16:creationId xmlns:a16="http://schemas.microsoft.com/office/drawing/2014/main" xmlns="" id="{4FC6BA20-1C32-4000-92DA-DF5FD0AA6F27}"/>
+                <a16:creationId xmlns:a16="http://schemas.microsoft.com/office/drawing/2014/main" id="{4FC6BA20-1C32-4000-92DA-DF5FD0AA6F27}"/>
               </a:ext>
             </a:extLst>
           </p:cNvPr>
@@ -1546,7 +1552,7 @@
           <p:cNvPr id="5" name="Footer Placeholder 4">
             <a:extLst>
               <a:ext uri="{FF2B5EF4-FFF2-40B4-BE49-F238E27FC236}">
-                <a16:creationId xmlns:a16="http://schemas.microsoft.com/office/drawing/2014/main" xmlns="" id="{576E4997-46FC-4684-94AC-02F6DC51350F}"/>
+                <a16:creationId xmlns:a16="http://schemas.microsoft.com/office/drawing/2014/main" id="{576E4997-46FC-4684-94AC-02F6DC51350F}"/>
               </a:ext>
             </a:extLst>
           </p:cNvPr>
@@ -1574,7 +1580,7 @@
           <p:cNvPr id="6" name="Slide Number Placeholder 5">
             <a:extLst>
               <a:ext uri="{FF2B5EF4-FFF2-40B4-BE49-F238E27FC236}">
-                <a16:creationId xmlns:a16="http://schemas.microsoft.com/office/drawing/2014/main" xmlns="" id="{5B7EA950-E410-4B54-BE05-DCDD3312FFFF}"/>
+                <a16:creationId xmlns:a16="http://schemas.microsoft.com/office/drawing/2014/main" id="{5B7EA950-E410-4B54-BE05-DCDD3312FFFF}"/>
               </a:ext>
             </a:extLst>
           </p:cNvPr>
@@ -1634,7 +1640,7 @@
           <p:cNvPr id="2" name="Title 1">
             <a:extLst>
               <a:ext uri="{FF2B5EF4-FFF2-40B4-BE49-F238E27FC236}">
-                <a16:creationId xmlns:a16="http://schemas.microsoft.com/office/drawing/2014/main" xmlns="" id="{A40E01E6-BF65-4C34-B3A6-B659CD689CAD}"/>
+                <a16:creationId xmlns:a16="http://schemas.microsoft.com/office/drawing/2014/main" id="{A40E01E6-BF65-4C34-B3A6-B659CD689CAD}"/>
               </a:ext>
             </a:extLst>
           </p:cNvPr>
@@ -1663,7 +1669,7 @@
           <p:cNvPr id="3" name="Content Placeholder 2">
             <a:extLst>
               <a:ext uri="{FF2B5EF4-FFF2-40B4-BE49-F238E27FC236}">
-                <a16:creationId xmlns:a16="http://schemas.microsoft.com/office/drawing/2014/main" xmlns="" id="{181F2C33-3767-472F-BD45-991A54F002EE}"/>
+                <a16:creationId xmlns:a16="http://schemas.microsoft.com/office/drawing/2014/main" id="{181F2C33-3767-472F-BD45-991A54F002EE}"/>
               </a:ext>
             </a:extLst>
           </p:cNvPr>
@@ -1726,7 +1732,7 @@
           <p:cNvPr id="4" name="Content Placeholder 3">
             <a:extLst>
               <a:ext uri="{FF2B5EF4-FFF2-40B4-BE49-F238E27FC236}">
-                <a16:creationId xmlns:a16="http://schemas.microsoft.com/office/drawing/2014/main" xmlns="" id="{B53C4111-77F7-4E9C-B8E3-5CE2E9445027}"/>
+                <a16:creationId xmlns:a16="http://schemas.microsoft.com/office/drawing/2014/main" id="{B53C4111-77F7-4E9C-B8E3-5CE2E9445027}"/>
               </a:ext>
             </a:extLst>
           </p:cNvPr>
@@ -1789,7 +1795,7 @@
           <p:cNvPr id="5" name="Date Placeholder 4">
             <a:extLst>
               <a:ext uri="{FF2B5EF4-FFF2-40B4-BE49-F238E27FC236}">
-                <a16:creationId xmlns:a16="http://schemas.microsoft.com/office/drawing/2014/main" xmlns="" id="{24FF7538-8C03-4803-89A2-1FC2D816AF1B}"/>
+                <a16:creationId xmlns:a16="http://schemas.microsoft.com/office/drawing/2014/main" id="{24FF7538-8C03-4803-89A2-1FC2D816AF1B}"/>
               </a:ext>
             </a:extLst>
           </p:cNvPr>
@@ -1819,7 +1825,7 @@
           <p:cNvPr id="6" name="Footer Placeholder 5">
             <a:extLst>
               <a:ext uri="{FF2B5EF4-FFF2-40B4-BE49-F238E27FC236}">
-                <a16:creationId xmlns:a16="http://schemas.microsoft.com/office/drawing/2014/main" xmlns="" id="{B1A8EFBA-6E65-47FD-8613-44C349DC35FA}"/>
+                <a16:creationId xmlns:a16="http://schemas.microsoft.com/office/drawing/2014/main" id="{B1A8EFBA-6E65-47FD-8613-44C349DC35FA}"/>
               </a:ext>
             </a:extLst>
           </p:cNvPr>
@@ -1847,7 +1853,7 @@
           <p:cNvPr id="7" name="Slide Number Placeholder 6">
             <a:extLst>
               <a:ext uri="{FF2B5EF4-FFF2-40B4-BE49-F238E27FC236}">
-                <a16:creationId xmlns:a16="http://schemas.microsoft.com/office/drawing/2014/main" xmlns="" id="{6A309E1D-F164-4F4A-AD29-3BC8FE19B7E5}"/>
+                <a16:creationId xmlns:a16="http://schemas.microsoft.com/office/drawing/2014/main" id="{6A309E1D-F164-4F4A-AD29-3BC8FE19B7E5}"/>
               </a:ext>
             </a:extLst>
           </p:cNvPr>
@@ -1907,7 +1913,7 @@
           <p:cNvPr id="2" name="Title 1">
             <a:extLst>
               <a:ext uri="{FF2B5EF4-FFF2-40B4-BE49-F238E27FC236}">
-                <a16:creationId xmlns:a16="http://schemas.microsoft.com/office/drawing/2014/main" xmlns="" id="{F4241170-35B2-40DF-8350-8A5396985F27}"/>
+                <a16:creationId xmlns:a16="http://schemas.microsoft.com/office/drawing/2014/main" id="{F4241170-35B2-40DF-8350-8A5396985F27}"/>
               </a:ext>
             </a:extLst>
           </p:cNvPr>
@@ -1941,7 +1947,7 @@
           <p:cNvPr id="3" name="Text Placeholder 2">
             <a:extLst>
               <a:ext uri="{FF2B5EF4-FFF2-40B4-BE49-F238E27FC236}">
-                <a16:creationId xmlns:a16="http://schemas.microsoft.com/office/drawing/2014/main" xmlns="" id="{02E02EE6-5BF9-4F22-98EC-A61443BFC106}"/>
+                <a16:creationId xmlns:a16="http://schemas.microsoft.com/office/drawing/2014/main" id="{02E02EE6-5BF9-4F22-98EC-A61443BFC106}"/>
               </a:ext>
             </a:extLst>
           </p:cNvPr>
@@ -2012,7 +2018,7 @@
           <p:cNvPr id="4" name="Content Placeholder 3">
             <a:extLst>
               <a:ext uri="{FF2B5EF4-FFF2-40B4-BE49-F238E27FC236}">
-                <a16:creationId xmlns:a16="http://schemas.microsoft.com/office/drawing/2014/main" xmlns="" id="{F959CD52-4212-42DE-AE16-2734A0881DE4}"/>
+                <a16:creationId xmlns:a16="http://schemas.microsoft.com/office/drawing/2014/main" id="{F959CD52-4212-42DE-AE16-2734A0881DE4}"/>
               </a:ext>
             </a:extLst>
           </p:cNvPr>
@@ -2075,7 +2081,7 @@
           <p:cNvPr id="5" name="Text Placeholder 4">
             <a:extLst>
               <a:ext uri="{FF2B5EF4-FFF2-40B4-BE49-F238E27FC236}">
-                <a16:creationId xmlns:a16="http://schemas.microsoft.com/office/drawing/2014/main" xmlns="" id="{3293CEA6-8B0E-4018-848E-D06DA419FFD0}"/>
+                <a16:creationId xmlns:a16="http://schemas.microsoft.com/office/drawing/2014/main" id="{3293CEA6-8B0E-4018-848E-D06DA419FFD0}"/>
               </a:ext>
             </a:extLst>
           </p:cNvPr>
@@ -2146,7 +2152,7 @@
           <p:cNvPr id="6" name="Content Placeholder 5">
             <a:extLst>
               <a:ext uri="{FF2B5EF4-FFF2-40B4-BE49-F238E27FC236}">
-                <a16:creationId xmlns:a16="http://schemas.microsoft.com/office/drawing/2014/main" xmlns="" id="{B4ECF992-E8BA-4F32-9F21-B79AFA8E613D}"/>
+                <a16:creationId xmlns:a16="http://schemas.microsoft.com/office/drawing/2014/main" id="{B4ECF992-E8BA-4F32-9F21-B79AFA8E613D}"/>
               </a:ext>
             </a:extLst>
           </p:cNvPr>
@@ -2209,7 +2215,7 @@
           <p:cNvPr id="7" name="Date Placeholder 6">
             <a:extLst>
               <a:ext uri="{FF2B5EF4-FFF2-40B4-BE49-F238E27FC236}">
-                <a16:creationId xmlns:a16="http://schemas.microsoft.com/office/drawing/2014/main" xmlns="" id="{E6820D55-DB61-4C02-8EA9-9CD390A2A925}"/>
+                <a16:creationId xmlns:a16="http://schemas.microsoft.com/office/drawing/2014/main" id="{E6820D55-DB61-4C02-8EA9-9CD390A2A925}"/>
               </a:ext>
             </a:extLst>
           </p:cNvPr>
@@ -2239,7 +2245,7 @@
           <p:cNvPr id="8" name="Footer Placeholder 7">
             <a:extLst>
               <a:ext uri="{FF2B5EF4-FFF2-40B4-BE49-F238E27FC236}">
-                <a16:creationId xmlns:a16="http://schemas.microsoft.com/office/drawing/2014/main" xmlns="" id="{FE20A79F-9EB1-4C8B-A060-8D2A0033ED96}"/>
+                <a16:creationId xmlns:a16="http://schemas.microsoft.com/office/drawing/2014/main" id="{FE20A79F-9EB1-4C8B-A060-8D2A0033ED96}"/>
               </a:ext>
             </a:extLst>
           </p:cNvPr>
@@ -2267,7 +2273,7 @@
           <p:cNvPr id="9" name="Slide Number Placeholder 8">
             <a:extLst>
               <a:ext uri="{FF2B5EF4-FFF2-40B4-BE49-F238E27FC236}">
-                <a16:creationId xmlns:a16="http://schemas.microsoft.com/office/drawing/2014/main" xmlns="" id="{4355B576-5575-4E69-B6E4-9E57B9D2F829}"/>
+                <a16:creationId xmlns:a16="http://schemas.microsoft.com/office/drawing/2014/main" id="{4355B576-5575-4E69-B6E4-9E57B9D2F829}"/>
               </a:ext>
             </a:extLst>
           </p:cNvPr>
@@ -2327,7 +2333,7 @@
           <p:cNvPr id="2" name="Title 1">
             <a:extLst>
               <a:ext uri="{FF2B5EF4-FFF2-40B4-BE49-F238E27FC236}">
-                <a16:creationId xmlns:a16="http://schemas.microsoft.com/office/drawing/2014/main" xmlns="" id="{412694C7-1299-445A-AA80-727CB5D77464}"/>
+                <a16:creationId xmlns:a16="http://schemas.microsoft.com/office/drawing/2014/main" id="{412694C7-1299-445A-AA80-727CB5D77464}"/>
               </a:ext>
             </a:extLst>
           </p:cNvPr>
@@ -2356,7 +2362,7 @@
           <p:cNvPr id="3" name="Date Placeholder 2">
             <a:extLst>
               <a:ext uri="{FF2B5EF4-FFF2-40B4-BE49-F238E27FC236}">
-                <a16:creationId xmlns:a16="http://schemas.microsoft.com/office/drawing/2014/main" xmlns="" id="{EBAFEBB1-AB4E-4C11-8BF5-42780D7191F1}"/>
+                <a16:creationId xmlns:a16="http://schemas.microsoft.com/office/drawing/2014/main" id="{EBAFEBB1-AB4E-4C11-8BF5-42780D7191F1}"/>
               </a:ext>
             </a:extLst>
           </p:cNvPr>
@@ -2386,7 +2392,7 @@
           <p:cNvPr id="4" name="Footer Placeholder 3">
             <a:extLst>
               <a:ext uri="{FF2B5EF4-FFF2-40B4-BE49-F238E27FC236}">
-                <a16:creationId xmlns:a16="http://schemas.microsoft.com/office/drawing/2014/main" xmlns="" id="{7B09B511-6F76-4915-B1AF-732BCED70E7E}"/>
+                <a16:creationId xmlns:a16="http://schemas.microsoft.com/office/drawing/2014/main" id="{7B09B511-6F76-4915-B1AF-732BCED70E7E}"/>
               </a:ext>
             </a:extLst>
           </p:cNvPr>
@@ -2414,7 +2420,7 @@
           <p:cNvPr id="5" name="Slide Number Placeholder 4">
             <a:extLst>
               <a:ext uri="{FF2B5EF4-FFF2-40B4-BE49-F238E27FC236}">
-                <a16:creationId xmlns:a16="http://schemas.microsoft.com/office/drawing/2014/main" xmlns="" id="{4F192E34-F782-4D15-B759-B5497A8BF2D5}"/>
+                <a16:creationId xmlns:a16="http://schemas.microsoft.com/office/drawing/2014/main" id="{4F192E34-F782-4D15-B759-B5497A8BF2D5}"/>
               </a:ext>
             </a:extLst>
           </p:cNvPr>
@@ -2474,7 +2480,7 @@
           <p:cNvPr id="2" name="Date Placeholder 1">
             <a:extLst>
               <a:ext uri="{FF2B5EF4-FFF2-40B4-BE49-F238E27FC236}">
-                <a16:creationId xmlns:a16="http://schemas.microsoft.com/office/drawing/2014/main" xmlns="" id="{1105FB1B-DD29-4A04-8996-FF05D89AF18F}"/>
+                <a16:creationId xmlns:a16="http://schemas.microsoft.com/office/drawing/2014/main" id="{1105FB1B-DD29-4A04-8996-FF05D89AF18F}"/>
               </a:ext>
             </a:extLst>
           </p:cNvPr>
@@ -2504,7 +2510,7 @@
           <p:cNvPr id="3" name="Footer Placeholder 2">
             <a:extLst>
               <a:ext uri="{FF2B5EF4-FFF2-40B4-BE49-F238E27FC236}">
-                <a16:creationId xmlns:a16="http://schemas.microsoft.com/office/drawing/2014/main" xmlns="" id="{08A97D2F-E2A4-438D-A067-1493B899029D}"/>
+                <a16:creationId xmlns:a16="http://schemas.microsoft.com/office/drawing/2014/main" id="{08A97D2F-E2A4-438D-A067-1493B899029D}"/>
               </a:ext>
             </a:extLst>
           </p:cNvPr>
@@ -2532,7 +2538,7 @@
           <p:cNvPr id="4" name="Slide Number Placeholder 3">
             <a:extLst>
               <a:ext uri="{FF2B5EF4-FFF2-40B4-BE49-F238E27FC236}">
-                <a16:creationId xmlns:a16="http://schemas.microsoft.com/office/drawing/2014/main" xmlns="" id="{82312123-8F85-4A48-9CA6-85E9B39ECE20}"/>
+                <a16:creationId xmlns:a16="http://schemas.microsoft.com/office/drawing/2014/main" id="{82312123-8F85-4A48-9CA6-85E9B39ECE20}"/>
               </a:ext>
             </a:extLst>
           </p:cNvPr>
@@ -2592,7 +2598,7 @@
           <p:cNvPr id="2" name="Title 1">
             <a:extLst>
               <a:ext uri="{FF2B5EF4-FFF2-40B4-BE49-F238E27FC236}">
-                <a16:creationId xmlns:a16="http://schemas.microsoft.com/office/drawing/2014/main" xmlns="" id="{E22EA615-E99F-4022-8C4A-E6A08ACB4312}"/>
+                <a16:creationId xmlns:a16="http://schemas.microsoft.com/office/drawing/2014/main" id="{E22EA615-E99F-4022-8C4A-E6A08ACB4312}"/>
               </a:ext>
             </a:extLst>
           </p:cNvPr>
@@ -2630,7 +2636,7 @@
           <p:cNvPr id="3" name="Content Placeholder 2">
             <a:extLst>
               <a:ext uri="{FF2B5EF4-FFF2-40B4-BE49-F238E27FC236}">
-                <a16:creationId xmlns:a16="http://schemas.microsoft.com/office/drawing/2014/main" xmlns="" id="{F14442B3-6064-406D-9F3F-50D9E0953350}"/>
+                <a16:creationId xmlns:a16="http://schemas.microsoft.com/office/drawing/2014/main" id="{F14442B3-6064-406D-9F3F-50D9E0953350}"/>
               </a:ext>
             </a:extLst>
           </p:cNvPr>
@@ -2721,7 +2727,7 @@
           <p:cNvPr id="4" name="Text Placeholder 3">
             <a:extLst>
               <a:ext uri="{FF2B5EF4-FFF2-40B4-BE49-F238E27FC236}">
-                <a16:creationId xmlns:a16="http://schemas.microsoft.com/office/drawing/2014/main" xmlns="" id="{E52191BC-0005-4884-BCCC-5A71C16FEA74}"/>
+                <a16:creationId xmlns:a16="http://schemas.microsoft.com/office/drawing/2014/main" id="{E52191BC-0005-4884-BCCC-5A71C16FEA74}"/>
               </a:ext>
             </a:extLst>
           </p:cNvPr>
@@ -2792,7 +2798,7 @@
           <p:cNvPr id="5" name="Date Placeholder 4">
             <a:extLst>
               <a:ext uri="{FF2B5EF4-FFF2-40B4-BE49-F238E27FC236}">
-                <a16:creationId xmlns:a16="http://schemas.microsoft.com/office/drawing/2014/main" xmlns="" id="{92EEEA7A-68E2-4B62-A1FA-1FEAA4DFB6DA}"/>
+                <a16:creationId xmlns:a16="http://schemas.microsoft.com/office/drawing/2014/main" id="{92EEEA7A-68E2-4B62-A1FA-1FEAA4DFB6DA}"/>
               </a:ext>
             </a:extLst>
           </p:cNvPr>
@@ -2822,7 +2828,7 @@
           <p:cNvPr id="6" name="Footer Placeholder 5">
             <a:extLst>
               <a:ext uri="{FF2B5EF4-FFF2-40B4-BE49-F238E27FC236}">
-                <a16:creationId xmlns:a16="http://schemas.microsoft.com/office/drawing/2014/main" xmlns="" id="{06DBF939-FF8D-453F-9C7E-3F780B57F398}"/>
+                <a16:creationId xmlns:a16="http://schemas.microsoft.com/office/drawing/2014/main" id="{06DBF939-FF8D-453F-9C7E-3F780B57F398}"/>
               </a:ext>
             </a:extLst>
           </p:cNvPr>
@@ -2850,7 +2856,7 @@
           <p:cNvPr id="7" name="Slide Number Placeholder 6">
             <a:extLst>
               <a:ext uri="{FF2B5EF4-FFF2-40B4-BE49-F238E27FC236}">
-                <a16:creationId xmlns:a16="http://schemas.microsoft.com/office/drawing/2014/main" xmlns="" id="{D6A5CE44-831B-4CE4-AD71-4FC7845DD3A3}"/>
+                <a16:creationId xmlns:a16="http://schemas.microsoft.com/office/drawing/2014/main" id="{D6A5CE44-831B-4CE4-AD71-4FC7845DD3A3}"/>
               </a:ext>
             </a:extLst>
           </p:cNvPr>
@@ -2910,7 +2916,7 @@
           <p:cNvPr id="2" name="Title 1">
             <a:extLst>
               <a:ext uri="{FF2B5EF4-FFF2-40B4-BE49-F238E27FC236}">
-                <a16:creationId xmlns:a16="http://schemas.microsoft.com/office/drawing/2014/main" xmlns="" id="{49F8A633-FF1A-4A86-A554-A6866ECC6796}"/>
+                <a16:creationId xmlns:a16="http://schemas.microsoft.com/office/drawing/2014/main" id="{49F8A633-FF1A-4A86-A554-A6866ECC6796}"/>
               </a:ext>
             </a:extLst>
           </p:cNvPr>
@@ -2948,7 +2954,7 @@
           <p:cNvPr id="3" name="Picture Placeholder 2">
             <a:extLst>
               <a:ext uri="{FF2B5EF4-FFF2-40B4-BE49-F238E27FC236}">
-                <a16:creationId xmlns:a16="http://schemas.microsoft.com/office/drawing/2014/main" xmlns="" id="{8B53D6D8-2C0B-4D5F-A538-5C4283B76897}"/>
+                <a16:creationId xmlns:a16="http://schemas.microsoft.com/office/drawing/2014/main" id="{8B53D6D8-2C0B-4D5F-A538-5C4283B76897}"/>
               </a:ext>
             </a:extLst>
           </p:cNvPr>
@@ -3019,7 +3025,7 @@
           <p:cNvPr id="4" name="Text Placeholder 3">
             <a:extLst>
               <a:ext uri="{FF2B5EF4-FFF2-40B4-BE49-F238E27FC236}">
-                <a16:creationId xmlns:a16="http://schemas.microsoft.com/office/drawing/2014/main" xmlns="" id="{2751E03C-A71C-4EDF-9F0C-AADD5BFFF187}"/>
+                <a16:creationId xmlns:a16="http://schemas.microsoft.com/office/drawing/2014/main" id="{2751E03C-A71C-4EDF-9F0C-AADD5BFFF187}"/>
               </a:ext>
             </a:extLst>
           </p:cNvPr>
@@ -3090,7 +3096,7 @@
           <p:cNvPr id="5" name="Date Placeholder 4">
             <a:extLst>
               <a:ext uri="{FF2B5EF4-FFF2-40B4-BE49-F238E27FC236}">
-                <a16:creationId xmlns:a16="http://schemas.microsoft.com/office/drawing/2014/main" xmlns="" id="{8AFB9132-2CBC-4D34-B53D-FF70E594F93F}"/>
+                <a16:creationId xmlns:a16="http://schemas.microsoft.com/office/drawing/2014/main" id="{8AFB9132-2CBC-4D34-B53D-FF70E594F93F}"/>
               </a:ext>
             </a:extLst>
           </p:cNvPr>
@@ -3120,7 +3126,7 @@
           <p:cNvPr id="6" name="Footer Placeholder 5">
             <a:extLst>
               <a:ext uri="{FF2B5EF4-FFF2-40B4-BE49-F238E27FC236}">
-                <a16:creationId xmlns:a16="http://schemas.microsoft.com/office/drawing/2014/main" xmlns="" id="{DBC4237C-448B-4DA3-AE9C-AE059EAB5FBE}"/>
+                <a16:creationId xmlns:a16="http://schemas.microsoft.com/office/drawing/2014/main" id="{DBC4237C-448B-4DA3-AE9C-AE059EAB5FBE}"/>
               </a:ext>
             </a:extLst>
           </p:cNvPr>
@@ -3148,7 +3154,7 @@
           <p:cNvPr id="7" name="Slide Number Placeholder 6">
             <a:extLst>
               <a:ext uri="{FF2B5EF4-FFF2-40B4-BE49-F238E27FC236}">
-                <a16:creationId xmlns:a16="http://schemas.microsoft.com/office/drawing/2014/main" xmlns="" id="{341FD285-1884-4757-A659-7563E433770D}"/>
+                <a16:creationId xmlns:a16="http://schemas.microsoft.com/office/drawing/2014/main" id="{341FD285-1884-4757-A659-7563E433770D}"/>
               </a:ext>
             </a:extLst>
           </p:cNvPr>
@@ -3213,7 +3219,7 @@
           <p:cNvPr id="2" name="Title Placeholder 1">
             <a:extLst>
               <a:ext uri="{FF2B5EF4-FFF2-40B4-BE49-F238E27FC236}">
-                <a16:creationId xmlns:a16="http://schemas.microsoft.com/office/drawing/2014/main" xmlns="" id="{55CE65F1-B7B2-4401-8D3E-90BA7FBB9934}"/>
+                <a16:creationId xmlns:a16="http://schemas.microsoft.com/office/drawing/2014/main" id="{55CE65F1-B7B2-4401-8D3E-90BA7FBB9934}"/>
               </a:ext>
             </a:extLst>
           </p:cNvPr>
@@ -3252,7 +3258,7 @@
           <p:cNvPr id="3" name="Text Placeholder 2">
             <a:extLst>
               <a:ext uri="{FF2B5EF4-FFF2-40B4-BE49-F238E27FC236}">
-                <a16:creationId xmlns:a16="http://schemas.microsoft.com/office/drawing/2014/main" xmlns="" id="{6E5F2DFA-53EC-4E58-9868-0D1C5941EBDC}"/>
+                <a16:creationId xmlns:a16="http://schemas.microsoft.com/office/drawing/2014/main" id="{6E5F2DFA-53EC-4E58-9868-0D1C5941EBDC}"/>
               </a:ext>
             </a:extLst>
           </p:cNvPr>
@@ -3320,7 +3326,7 @@
           <p:cNvPr id="4" name="Date Placeholder 3">
             <a:extLst>
               <a:ext uri="{FF2B5EF4-FFF2-40B4-BE49-F238E27FC236}">
-                <a16:creationId xmlns:a16="http://schemas.microsoft.com/office/drawing/2014/main" xmlns="" id="{F121C156-921C-4B6C-B347-41C3EBCE1A39}"/>
+                <a16:creationId xmlns:a16="http://schemas.microsoft.com/office/drawing/2014/main" id="{F121C156-921C-4B6C-B347-41C3EBCE1A39}"/>
               </a:ext>
             </a:extLst>
           </p:cNvPr>
@@ -3368,7 +3374,7 @@
           <p:cNvPr id="5" name="Footer Placeholder 4">
             <a:extLst>
               <a:ext uri="{FF2B5EF4-FFF2-40B4-BE49-F238E27FC236}">
-                <a16:creationId xmlns:a16="http://schemas.microsoft.com/office/drawing/2014/main" xmlns="" id="{ED741EB9-BE5B-4FCE-8459-60A68128D709}"/>
+                <a16:creationId xmlns:a16="http://schemas.microsoft.com/office/drawing/2014/main" id="{ED741EB9-BE5B-4FCE-8459-60A68128D709}"/>
               </a:ext>
             </a:extLst>
           </p:cNvPr>
@@ -3414,7 +3420,7 @@
           <p:cNvPr id="6" name="Slide Number Placeholder 5">
             <a:extLst>
               <a:ext uri="{FF2B5EF4-FFF2-40B4-BE49-F238E27FC236}">
-                <a16:creationId xmlns:a16="http://schemas.microsoft.com/office/drawing/2014/main" xmlns="" id="{903264B3-BCAF-4423-B5AB-31245A719D63}"/>
+                <a16:creationId xmlns:a16="http://schemas.microsoft.com/office/drawing/2014/main" id="{903264B3-BCAF-4423-B5AB-31245A719D63}"/>
               </a:ext>
             </a:extLst>
           </p:cNvPr>
@@ -3784,7 +3790,7 @@
           <p:cNvPr id="2" name="Title 1">
             <a:extLst>
               <a:ext uri="{FF2B5EF4-FFF2-40B4-BE49-F238E27FC236}">
-                <a16:creationId xmlns:a16="http://schemas.microsoft.com/office/drawing/2014/main" xmlns="" id="{7429D11E-1799-45FA-B0C6-7D6F2A6E14BC}"/>
+                <a16:creationId xmlns:a16="http://schemas.microsoft.com/office/drawing/2014/main" id="{7429D11E-1799-45FA-B0C6-7D6F2A6E14BC}"/>
               </a:ext>
             </a:extLst>
           </p:cNvPr>
@@ -3829,7 +3835,7 @@
           <p:cNvPr id="3" name="Subtitle 2">
             <a:extLst>
               <a:ext uri="{FF2B5EF4-FFF2-40B4-BE49-F238E27FC236}">
-                <a16:creationId xmlns:a16="http://schemas.microsoft.com/office/drawing/2014/main" xmlns="" id="{EB23C6C5-176A-4DB9-B1BC-D6B06ED95008}"/>
+                <a16:creationId xmlns:a16="http://schemas.microsoft.com/office/drawing/2014/main" id="{EB23C6C5-176A-4DB9-B1BC-D6B06ED95008}"/>
               </a:ext>
             </a:extLst>
           </p:cNvPr>
@@ -3868,7 +3874,7 @@
           <p:cNvPr id="4" name="Picture 3">
             <a:extLst>
               <a:ext uri="{FF2B5EF4-FFF2-40B4-BE49-F238E27FC236}">
-                <a16:creationId xmlns:a16="http://schemas.microsoft.com/office/drawing/2014/main" xmlns="" id="{C1D09AB7-3A51-47CD-BC5E-AFF1EE385645}"/>
+                <a16:creationId xmlns:a16="http://schemas.microsoft.com/office/drawing/2014/main" id="{C1D09AB7-3A51-47CD-BC5E-AFF1EE385645}"/>
               </a:ext>
             </a:extLst>
           </p:cNvPr>
@@ -3898,7 +3904,7 @@
           <p:cNvPr id="5" name="TextBox 4">
             <a:extLst>
               <a:ext uri="{FF2B5EF4-FFF2-40B4-BE49-F238E27FC236}">
-                <a16:creationId xmlns:a16="http://schemas.microsoft.com/office/drawing/2014/main" xmlns="" id="{FACE4605-4953-4CBB-B635-0B0762C43748}"/>
+                <a16:creationId xmlns:a16="http://schemas.microsoft.com/office/drawing/2014/main" id="{FACE4605-4953-4CBB-B635-0B0762C43748}"/>
               </a:ext>
             </a:extLst>
           </p:cNvPr>
@@ -3939,7 +3945,7 @@
                   <a:srgbClr val="002060"/>
                 </a:solidFill>
               </a:rPr>
-              <a:t>PROJECT TITLE</a:t>
+              <a:t>WIN-WALK</a:t>
             </a:r>
           </a:p>
         </p:txBody>
@@ -3949,7 +3955,7 @@
           <p:cNvPr id="6" name="TextBox 5">
             <a:extLst>
               <a:ext uri="{FF2B5EF4-FFF2-40B4-BE49-F238E27FC236}">
-                <a16:creationId xmlns:a16="http://schemas.microsoft.com/office/drawing/2014/main" xmlns="" id="{842CF2DE-BB0C-4F8A-A1B5-9C68C76566B8}"/>
+                <a16:creationId xmlns:a16="http://schemas.microsoft.com/office/drawing/2014/main" id="{842CF2DE-BB0C-4F8A-A1B5-9C68C76566B8}"/>
               </a:ext>
             </a:extLst>
           </p:cNvPr>
@@ -3959,7 +3965,7 @@
         <p:spPr>
           <a:xfrm>
             <a:off x="188536" y="4902680"/>
-            <a:ext cx="4506012" cy="1846659"/>
+            <a:ext cx="4506012" cy="1200329"/>
           </a:xfrm>
           <a:prstGeom prst="rect">
             <a:avLst/>
@@ -3990,7 +3996,7 @@
                   <a:srgbClr val="002060"/>
                 </a:solidFill>
               </a:rPr>
-              <a:t>Student 1 Name    USN</a:t>
+              <a:t>Rakesh M R 1VA17CS040</a:t>
             </a:r>
           </a:p>
           <a:p>
@@ -4001,22 +4007,8 @@
                   <a:srgbClr val="002060"/>
                 </a:solidFill>
               </a:rPr>
-              <a:t>Student 2 Name    USN</a:t>
-            </a:r>
-          </a:p>
-          <a:p>
-            <a:pPr algn="ctr"/>
-            <a:r>
-              <a:rPr lang="en-IN" sz="2400" b="1" dirty="0">
-                <a:solidFill>
-                  <a:srgbClr val="002060"/>
-                </a:solidFill>
-              </a:rPr>
-              <a:t>Student 3 Name    USN</a:t>
-            </a:r>
-          </a:p>
-          <a:p>
-            <a:endParaRPr lang="en-IN" dirty="0"/>
+              <a:t>B G Vinayak 1VA17CS010</a:t>
+            </a:r>
           </a:p>
         </p:txBody>
       </p:sp>
@@ -4025,7 +4017,7 @@
           <p:cNvPr id="7" name="TextBox 6">
             <a:extLst>
               <a:ext uri="{FF2B5EF4-FFF2-40B4-BE49-F238E27FC236}">
-                <a16:creationId xmlns:a16="http://schemas.microsoft.com/office/drawing/2014/main" xmlns="" id="{B54F4046-2247-4401-88D7-9C839B401B89}"/>
+                <a16:creationId xmlns:a16="http://schemas.microsoft.com/office/drawing/2014/main" id="{B54F4046-2247-4401-88D7-9C839B401B89}"/>
               </a:ext>
             </a:extLst>
           </p:cNvPr>
@@ -4066,7 +4058,23 @@
                   <a:srgbClr val="002060"/>
                 </a:solidFill>
               </a:rPr>
-              <a:t>Guide Name</a:t>
+              <a:t>Mr. </a:t>
+            </a:r>
+            <a:r>
+              <a:rPr lang="en-IN" sz="2400" b="1" dirty="0" err="1">
+                <a:solidFill>
+                  <a:srgbClr val="002060"/>
+                </a:solidFill>
+              </a:rPr>
+              <a:t>Nagamahesh</a:t>
+            </a:r>
+            <a:r>
+              <a:rPr lang="en-IN" sz="2400" b="1" dirty="0">
+                <a:solidFill>
+                  <a:srgbClr val="002060"/>
+                </a:solidFill>
+              </a:rPr>
+              <a:t> B S</a:t>
             </a:r>
           </a:p>
           <a:p>
@@ -4077,7 +4085,7 @@
                   <a:srgbClr val="002060"/>
                 </a:solidFill>
               </a:rPr>
-              <a:t>Designation</a:t>
+              <a:t>Assistant Professor</a:t>
             </a:r>
           </a:p>
           <a:p>
@@ -4088,7 +4096,7 @@
                   <a:srgbClr val="002060"/>
                 </a:solidFill>
               </a:rPr>
-              <a:t>Department</a:t>
+              <a:t>Dept. of CSE, SVIT</a:t>
             </a:r>
           </a:p>
         </p:txBody>
@@ -4098,7 +4106,7 @@
           <p:cNvPr id="8" name="TextBox 7">
             <a:extLst>
               <a:ext uri="{FF2B5EF4-FFF2-40B4-BE49-F238E27FC236}">
-                <a16:creationId xmlns:a16="http://schemas.microsoft.com/office/drawing/2014/main" xmlns="" id="{3E4D2BB2-F645-4614-9A42-33A44804E7A8}"/>
+                <a16:creationId xmlns:a16="http://schemas.microsoft.com/office/drawing/2014/main" id="{3E4D2BB2-F645-4614-9A42-33A44804E7A8}"/>
               </a:ext>
             </a:extLst>
           </p:cNvPr>
@@ -4128,23 +4136,7 @@
                   <a:srgbClr val="002060"/>
                 </a:solidFill>
               </a:rPr>
-              <a:t>Department of </a:t>
-            </a:r>
-            <a:r>
-              <a:rPr lang="en-IN" sz="3200" b="1" dirty="0" smtClean="0">
-                <a:solidFill>
-                  <a:srgbClr val="002060"/>
-                </a:solidFill>
-              </a:rPr>
-              <a:t>Computer </a:t>
-            </a:r>
-            <a:r>
-              <a:rPr lang="en-IN" sz="3200" b="1" dirty="0">
-                <a:solidFill>
-                  <a:srgbClr val="002060"/>
-                </a:solidFill>
-              </a:rPr>
-              <a:t>Science and Engineering</a:t>
+              <a:t>Department of Computer Science and Engineering</a:t>
             </a:r>
           </a:p>
         </p:txBody>
@@ -4184,7 +4176,7 @@
           <p:cNvPr id="2" name="Title 1">
             <a:extLst>
               <a:ext uri="{FF2B5EF4-FFF2-40B4-BE49-F238E27FC236}">
-                <a16:creationId xmlns:a16="http://schemas.microsoft.com/office/drawing/2014/main" xmlns="" id="{F82EF132-6DF6-4CA0-B333-B03D94DE9F9E}"/>
+                <a16:creationId xmlns:a16="http://schemas.microsoft.com/office/drawing/2014/main" id="{F82EF132-6DF6-4CA0-B333-B03D94DE9F9E}"/>
               </a:ext>
             </a:extLst>
           </p:cNvPr>
@@ -4229,7 +4221,7 @@
           <p:cNvPr id="3" name="Content Placeholder 2">
             <a:extLst>
               <a:ext uri="{FF2B5EF4-FFF2-40B4-BE49-F238E27FC236}">
-                <a16:creationId xmlns:a16="http://schemas.microsoft.com/office/drawing/2014/main" xmlns="" id="{E6CDD646-3FD1-42E3-B283-E0E745697FFC}"/>
+                <a16:creationId xmlns:a16="http://schemas.microsoft.com/office/drawing/2014/main" id="{E6CDD646-3FD1-42E3-B283-E0E745697FFC}"/>
               </a:ext>
             </a:extLst>
           </p:cNvPr>
@@ -4297,7 +4289,7 @@
           <p:cNvPr id="6" name="Picture 5">
             <a:extLst>
               <a:ext uri="{FF2B5EF4-FFF2-40B4-BE49-F238E27FC236}">
-                <a16:creationId xmlns:a16="http://schemas.microsoft.com/office/drawing/2014/main" xmlns="" id="{0C787187-C5D7-4EC8-AAA7-3E11DCB132B4}"/>
+                <a16:creationId xmlns:a16="http://schemas.microsoft.com/office/drawing/2014/main" id="{0C787187-C5D7-4EC8-AAA7-3E11DCB132B4}"/>
               </a:ext>
             </a:extLst>
           </p:cNvPr>
@@ -4327,7 +4319,7 @@
           <p:cNvPr id="7" name="TextBox 6">
             <a:extLst>
               <a:ext uri="{FF2B5EF4-FFF2-40B4-BE49-F238E27FC236}">
-                <a16:creationId xmlns:a16="http://schemas.microsoft.com/office/drawing/2014/main" xmlns="" id="{223CB7BF-1D14-46EC-8E3E-24EFBDD1B9DB}"/>
+                <a16:creationId xmlns:a16="http://schemas.microsoft.com/office/drawing/2014/main" id="{223CB7BF-1D14-46EC-8E3E-24EFBDD1B9DB}"/>
               </a:ext>
             </a:extLst>
           </p:cNvPr>
@@ -4376,20 +4368,7 @@
                   <a:schemeClr val="bg1"/>
                 </a:solidFill>
               </a:rPr>
-              <a:t>of </a:t>
-            </a:r>
-            <a:r>
-              <a:rPr lang="en-IN" smtClean="0">
-                <a:ln>
-                  <a:solidFill>
-                    <a:schemeClr val="bg1"/>
-                  </a:solidFill>
-                </a:ln>
-                <a:solidFill>
-                  <a:schemeClr val="bg1"/>
-                </a:solidFill>
-              </a:rPr>
-              <a:t>CSE</a:t>
+              <a:t>of CSE</a:t>
             </a:r>
             <a:r>
               <a:rPr lang="en-IN" dirty="0">
@@ -4435,6 +4414,1216 @@
     <p:extLst>
       <p:ext uri="{BB962C8B-B14F-4D97-AF65-F5344CB8AC3E}">
         <p14:creationId xmlns:p14="http://schemas.microsoft.com/office/powerpoint/2010/main" val="424633132"/>
+      </p:ext>
+    </p:extLst>
+  </p:cSld>
+  <p:clrMapOvr>
+    <a:masterClrMapping/>
+  </p:clrMapOvr>
+</p:sld>
+</file>
+
+<file path=ppt/slides/slide3.xml><?xml version="1.0" encoding="utf-8"?>
+<p:sld xmlns:a="http://schemas.openxmlformats.org/drawingml/2006/main" xmlns:r="http://schemas.openxmlformats.org/officeDocument/2006/relationships" xmlns:p="http://schemas.openxmlformats.org/presentationml/2006/main">
+  <p:cSld>
+    <p:spTree>
+      <p:nvGrpSpPr>
+        <p:cNvPr id="1" name=""/>
+        <p:cNvGrpSpPr/>
+        <p:nvPr/>
+      </p:nvGrpSpPr>
+      <p:grpSpPr>
+        <a:xfrm>
+          <a:off x="0" y="0"/>
+          <a:ext cx="0" cy="0"/>
+          <a:chOff x="0" y="0"/>
+          <a:chExt cx="0" cy="0"/>
+        </a:xfrm>
+      </p:grpSpPr>
+      <p:sp>
+        <p:nvSpPr>
+          <p:cNvPr id="2" name="Title 1">
+            <a:extLst>
+              <a:ext uri="{FF2B5EF4-FFF2-40B4-BE49-F238E27FC236}">
+                <a16:creationId xmlns:a16="http://schemas.microsoft.com/office/drawing/2014/main" id="{F82EF132-6DF6-4CA0-B333-B03D94DE9F9E}"/>
+              </a:ext>
+            </a:extLst>
+          </p:cNvPr>
+          <p:cNvSpPr>
+            <a:spLocks noGrp="1"/>
+          </p:cNvSpPr>
+          <p:nvPr>
+            <p:ph type="title"/>
+          </p:nvPr>
+        </p:nvSpPr>
+        <p:spPr>
+          <a:xfrm>
+            <a:off x="0" y="242577"/>
+            <a:ext cx="9879291" cy="844197"/>
+          </a:xfrm>
+          <a:solidFill>
+            <a:srgbClr val="002060"/>
+          </a:solidFill>
+        </p:spPr>
+        <p:txBody>
+          <a:bodyPr/>
+          <a:lstStyle/>
+          <a:p>
+            <a:r>
+              <a:rPr lang="en-IN" b="1" dirty="0">
+                <a:ln>
+                  <a:solidFill>
+                    <a:schemeClr val="bg1"/>
+                  </a:solidFill>
+                </a:ln>
+                <a:solidFill>
+                  <a:schemeClr val="bg1"/>
+                </a:solidFill>
+              </a:rPr>
+              <a:t>Introduction</a:t>
+            </a:r>
+          </a:p>
+        </p:txBody>
+      </p:sp>
+      <p:pic>
+        <p:nvPicPr>
+          <p:cNvPr id="6" name="Picture 5">
+            <a:extLst>
+              <a:ext uri="{FF2B5EF4-FFF2-40B4-BE49-F238E27FC236}">
+                <a16:creationId xmlns:a16="http://schemas.microsoft.com/office/drawing/2014/main" id="{0C787187-C5D7-4EC8-AAA7-3E11DCB132B4}"/>
+              </a:ext>
+            </a:extLst>
+          </p:cNvPr>
+          <p:cNvPicPr>
+            <a:picLocks noChangeAspect="1"/>
+          </p:cNvPicPr>
+          <p:nvPr/>
+        </p:nvPicPr>
+        <p:blipFill>
+          <a:blip r:embed="rId2" cstate="print"/>
+          <a:stretch>
+            <a:fillRect/>
+          </a:stretch>
+        </p:blipFill>
+        <p:spPr>
+          <a:xfrm>
+            <a:off x="11117035" y="11809"/>
+            <a:ext cx="1074965" cy="1074965"/>
+          </a:xfrm>
+          <a:prstGeom prst="rect">
+            <a:avLst/>
+          </a:prstGeom>
+        </p:spPr>
+      </p:pic>
+      <p:sp>
+        <p:nvSpPr>
+          <p:cNvPr id="7" name="TextBox 6">
+            <a:extLst>
+              <a:ext uri="{FF2B5EF4-FFF2-40B4-BE49-F238E27FC236}">
+                <a16:creationId xmlns:a16="http://schemas.microsoft.com/office/drawing/2014/main" id="{223CB7BF-1D14-46EC-8E3E-24EFBDD1B9DB}"/>
+              </a:ext>
+            </a:extLst>
+          </p:cNvPr>
+          <p:cNvSpPr txBox="1"/>
+          <p:nvPr/>
+        </p:nvSpPr>
+        <p:spPr>
+          <a:xfrm>
+            <a:off x="0" y="6538912"/>
+            <a:ext cx="12192000" cy="369332"/>
+          </a:xfrm>
+          <a:prstGeom prst="rect">
+            <a:avLst/>
+          </a:prstGeom>
+          <a:solidFill>
+            <a:srgbClr val="002060"/>
+          </a:solidFill>
+        </p:spPr>
+        <p:txBody>
+          <a:bodyPr wrap="square" rtlCol="0">
+            <a:spAutoFit/>
+          </a:bodyPr>
+          <a:lstStyle/>
+          <a:p>
+            <a:r>
+              <a:rPr lang="en-IN" dirty="0">
+                <a:ln>
+                  <a:solidFill>
+                    <a:schemeClr val="bg1"/>
+                  </a:solidFill>
+                </a:ln>
+                <a:solidFill>
+                  <a:schemeClr val="bg1"/>
+                </a:solidFill>
+              </a:rPr>
+              <a:t>Dept. </a:t>
+            </a:r>
+            <a:r>
+              <a:rPr lang="en-IN">
+                <a:ln>
+                  <a:solidFill>
+                    <a:schemeClr val="bg1"/>
+                  </a:solidFill>
+                </a:ln>
+                <a:solidFill>
+                  <a:schemeClr val="bg1"/>
+                </a:solidFill>
+              </a:rPr>
+              <a:t>of CSE</a:t>
+            </a:r>
+            <a:r>
+              <a:rPr lang="en-IN" dirty="0">
+                <a:ln>
+                  <a:solidFill>
+                    <a:schemeClr val="bg1"/>
+                  </a:solidFill>
+                </a:ln>
+                <a:solidFill>
+                  <a:schemeClr val="bg1"/>
+                </a:solidFill>
+              </a:rPr>
+              <a:t>, SVIT                                                                                                                                                                                     </a:t>
+            </a:r>
+            <a:fld id="{A779D412-7551-4DA0-A19D-519BB8214474}" type="slidenum">
+              <a:rPr lang="en-IN" smtClean="0">
+                <a:ln>
+                  <a:solidFill>
+                    <a:schemeClr val="bg1"/>
+                  </a:solidFill>
+                </a:ln>
+                <a:solidFill>
+                  <a:schemeClr val="bg1"/>
+                </a:solidFill>
+              </a:rPr>
+              <a:pPr/>
+              <a:t>3</a:t>
+            </a:fld>
+            <a:endParaRPr lang="en-IN" dirty="0">
+              <a:ln>
+                <a:solidFill>
+                  <a:schemeClr val="bg1"/>
+                </a:solidFill>
+              </a:ln>
+              <a:solidFill>
+                <a:schemeClr val="bg1"/>
+              </a:solidFill>
+            </a:endParaRPr>
+          </a:p>
+        </p:txBody>
+      </p:sp>
+    </p:spTree>
+    <p:extLst>
+      <p:ext uri="{BB962C8B-B14F-4D97-AF65-F5344CB8AC3E}">
+        <p14:creationId xmlns:p14="http://schemas.microsoft.com/office/powerpoint/2010/main" val="1303102835"/>
+      </p:ext>
+    </p:extLst>
+  </p:cSld>
+  <p:clrMapOvr>
+    <a:masterClrMapping/>
+  </p:clrMapOvr>
+</p:sld>
+</file>
+
+<file path=ppt/slides/slide4.xml><?xml version="1.0" encoding="utf-8"?>
+<p:sld xmlns:a="http://schemas.openxmlformats.org/drawingml/2006/main" xmlns:r="http://schemas.openxmlformats.org/officeDocument/2006/relationships" xmlns:p="http://schemas.openxmlformats.org/presentationml/2006/main">
+  <p:cSld>
+    <p:spTree>
+      <p:nvGrpSpPr>
+        <p:cNvPr id="1" name=""/>
+        <p:cNvGrpSpPr/>
+        <p:nvPr/>
+      </p:nvGrpSpPr>
+      <p:grpSpPr>
+        <a:xfrm>
+          <a:off x="0" y="0"/>
+          <a:ext cx="0" cy="0"/>
+          <a:chOff x="0" y="0"/>
+          <a:chExt cx="0" cy="0"/>
+        </a:xfrm>
+      </p:grpSpPr>
+      <p:sp>
+        <p:nvSpPr>
+          <p:cNvPr id="2" name="Title 1">
+            <a:extLst>
+              <a:ext uri="{FF2B5EF4-FFF2-40B4-BE49-F238E27FC236}">
+                <a16:creationId xmlns:a16="http://schemas.microsoft.com/office/drawing/2014/main" id="{F82EF132-6DF6-4CA0-B333-B03D94DE9F9E}"/>
+              </a:ext>
+            </a:extLst>
+          </p:cNvPr>
+          <p:cNvSpPr>
+            <a:spLocks noGrp="1"/>
+          </p:cNvSpPr>
+          <p:nvPr>
+            <p:ph type="title"/>
+          </p:nvPr>
+        </p:nvSpPr>
+        <p:spPr>
+          <a:xfrm>
+            <a:off x="0" y="242577"/>
+            <a:ext cx="9879291" cy="844197"/>
+          </a:xfrm>
+          <a:solidFill>
+            <a:srgbClr val="002060"/>
+          </a:solidFill>
+        </p:spPr>
+        <p:txBody>
+          <a:bodyPr/>
+          <a:lstStyle/>
+          <a:p>
+            <a:r>
+              <a:rPr lang="en-IN" b="1" dirty="0">
+                <a:ln>
+                  <a:solidFill>
+                    <a:schemeClr val="bg1"/>
+                  </a:solidFill>
+                </a:ln>
+                <a:solidFill>
+                  <a:schemeClr val="bg1"/>
+                </a:solidFill>
+              </a:rPr>
+              <a:t>System Requirement Specification </a:t>
+            </a:r>
+          </a:p>
+        </p:txBody>
+      </p:sp>
+      <p:pic>
+        <p:nvPicPr>
+          <p:cNvPr id="6" name="Picture 5">
+            <a:extLst>
+              <a:ext uri="{FF2B5EF4-FFF2-40B4-BE49-F238E27FC236}">
+                <a16:creationId xmlns:a16="http://schemas.microsoft.com/office/drawing/2014/main" id="{0C787187-C5D7-4EC8-AAA7-3E11DCB132B4}"/>
+              </a:ext>
+            </a:extLst>
+          </p:cNvPr>
+          <p:cNvPicPr>
+            <a:picLocks noChangeAspect="1"/>
+          </p:cNvPicPr>
+          <p:nvPr/>
+        </p:nvPicPr>
+        <p:blipFill>
+          <a:blip r:embed="rId2" cstate="print"/>
+          <a:stretch>
+            <a:fillRect/>
+          </a:stretch>
+        </p:blipFill>
+        <p:spPr>
+          <a:xfrm>
+            <a:off x="11117035" y="11809"/>
+            <a:ext cx="1074965" cy="1074965"/>
+          </a:xfrm>
+          <a:prstGeom prst="rect">
+            <a:avLst/>
+          </a:prstGeom>
+        </p:spPr>
+      </p:pic>
+      <p:sp>
+        <p:nvSpPr>
+          <p:cNvPr id="7" name="TextBox 6">
+            <a:extLst>
+              <a:ext uri="{FF2B5EF4-FFF2-40B4-BE49-F238E27FC236}">
+                <a16:creationId xmlns:a16="http://schemas.microsoft.com/office/drawing/2014/main" id="{223CB7BF-1D14-46EC-8E3E-24EFBDD1B9DB}"/>
+              </a:ext>
+            </a:extLst>
+          </p:cNvPr>
+          <p:cNvSpPr txBox="1"/>
+          <p:nvPr/>
+        </p:nvSpPr>
+        <p:spPr>
+          <a:xfrm>
+            <a:off x="0" y="6538912"/>
+            <a:ext cx="12192000" cy="369332"/>
+          </a:xfrm>
+          <a:prstGeom prst="rect">
+            <a:avLst/>
+          </a:prstGeom>
+          <a:solidFill>
+            <a:srgbClr val="002060"/>
+          </a:solidFill>
+        </p:spPr>
+        <p:txBody>
+          <a:bodyPr wrap="square" rtlCol="0">
+            <a:spAutoFit/>
+          </a:bodyPr>
+          <a:lstStyle/>
+          <a:p>
+            <a:r>
+              <a:rPr lang="en-IN" dirty="0">
+                <a:ln>
+                  <a:solidFill>
+                    <a:schemeClr val="bg1"/>
+                  </a:solidFill>
+                </a:ln>
+                <a:solidFill>
+                  <a:schemeClr val="bg1"/>
+                </a:solidFill>
+              </a:rPr>
+              <a:t>Dept. </a:t>
+            </a:r>
+            <a:r>
+              <a:rPr lang="en-IN">
+                <a:ln>
+                  <a:solidFill>
+                    <a:schemeClr val="bg1"/>
+                  </a:solidFill>
+                </a:ln>
+                <a:solidFill>
+                  <a:schemeClr val="bg1"/>
+                </a:solidFill>
+              </a:rPr>
+              <a:t>of CSE</a:t>
+            </a:r>
+            <a:r>
+              <a:rPr lang="en-IN" dirty="0">
+                <a:ln>
+                  <a:solidFill>
+                    <a:schemeClr val="bg1"/>
+                  </a:solidFill>
+                </a:ln>
+                <a:solidFill>
+                  <a:schemeClr val="bg1"/>
+                </a:solidFill>
+              </a:rPr>
+              <a:t>, SVIT                                                                                                                                                                                     </a:t>
+            </a:r>
+            <a:fld id="{A779D412-7551-4DA0-A19D-519BB8214474}" type="slidenum">
+              <a:rPr lang="en-IN" smtClean="0">
+                <a:ln>
+                  <a:solidFill>
+                    <a:schemeClr val="bg1"/>
+                  </a:solidFill>
+                </a:ln>
+                <a:solidFill>
+                  <a:schemeClr val="bg1"/>
+                </a:solidFill>
+              </a:rPr>
+              <a:pPr/>
+              <a:t>4</a:t>
+            </a:fld>
+            <a:endParaRPr lang="en-IN" dirty="0">
+              <a:ln>
+                <a:solidFill>
+                  <a:schemeClr val="bg1"/>
+                </a:solidFill>
+              </a:ln>
+              <a:solidFill>
+                <a:schemeClr val="bg1"/>
+              </a:solidFill>
+            </a:endParaRPr>
+          </a:p>
+        </p:txBody>
+      </p:sp>
+    </p:spTree>
+    <p:extLst>
+      <p:ext uri="{BB962C8B-B14F-4D97-AF65-F5344CB8AC3E}">
+        <p14:creationId xmlns:p14="http://schemas.microsoft.com/office/powerpoint/2010/main" val="1338710797"/>
+      </p:ext>
+    </p:extLst>
+  </p:cSld>
+  <p:clrMapOvr>
+    <a:masterClrMapping/>
+  </p:clrMapOvr>
+</p:sld>
+</file>
+
+<file path=ppt/slides/slide5.xml><?xml version="1.0" encoding="utf-8"?>
+<p:sld xmlns:a="http://schemas.openxmlformats.org/drawingml/2006/main" xmlns:r="http://schemas.openxmlformats.org/officeDocument/2006/relationships" xmlns:p="http://schemas.openxmlformats.org/presentationml/2006/main">
+  <p:cSld>
+    <p:spTree>
+      <p:nvGrpSpPr>
+        <p:cNvPr id="1" name=""/>
+        <p:cNvGrpSpPr/>
+        <p:nvPr/>
+      </p:nvGrpSpPr>
+      <p:grpSpPr>
+        <a:xfrm>
+          <a:off x="0" y="0"/>
+          <a:ext cx="0" cy="0"/>
+          <a:chOff x="0" y="0"/>
+          <a:chExt cx="0" cy="0"/>
+        </a:xfrm>
+      </p:grpSpPr>
+      <p:sp>
+        <p:nvSpPr>
+          <p:cNvPr id="2" name="Title 1">
+            <a:extLst>
+              <a:ext uri="{FF2B5EF4-FFF2-40B4-BE49-F238E27FC236}">
+                <a16:creationId xmlns:a16="http://schemas.microsoft.com/office/drawing/2014/main" id="{F82EF132-6DF6-4CA0-B333-B03D94DE9F9E}"/>
+              </a:ext>
+            </a:extLst>
+          </p:cNvPr>
+          <p:cNvSpPr>
+            <a:spLocks noGrp="1"/>
+          </p:cNvSpPr>
+          <p:nvPr>
+            <p:ph type="title"/>
+          </p:nvPr>
+        </p:nvSpPr>
+        <p:spPr>
+          <a:xfrm>
+            <a:off x="0" y="242577"/>
+            <a:ext cx="9879291" cy="844197"/>
+          </a:xfrm>
+          <a:solidFill>
+            <a:srgbClr val="002060"/>
+          </a:solidFill>
+        </p:spPr>
+        <p:txBody>
+          <a:bodyPr>
+            <a:normAutofit/>
+          </a:bodyPr>
+          <a:lstStyle/>
+          <a:p>
+            <a:r>
+              <a:rPr lang="en-IN" b="1" dirty="0">
+                <a:ln>
+                  <a:solidFill>
+                    <a:schemeClr val="bg1"/>
+                  </a:solidFill>
+                </a:ln>
+                <a:solidFill>
+                  <a:schemeClr val="bg1"/>
+                </a:solidFill>
+              </a:rPr>
+              <a:t>System Architecture</a:t>
+            </a:r>
+          </a:p>
+        </p:txBody>
+      </p:sp>
+      <p:pic>
+        <p:nvPicPr>
+          <p:cNvPr id="6" name="Picture 5">
+            <a:extLst>
+              <a:ext uri="{FF2B5EF4-FFF2-40B4-BE49-F238E27FC236}">
+                <a16:creationId xmlns:a16="http://schemas.microsoft.com/office/drawing/2014/main" id="{0C787187-C5D7-4EC8-AAA7-3E11DCB132B4}"/>
+              </a:ext>
+            </a:extLst>
+          </p:cNvPr>
+          <p:cNvPicPr>
+            <a:picLocks noChangeAspect="1"/>
+          </p:cNvPicPr>
+          <p:nvPr/>
+        </p:nvPicPr>
+        <p:blipFill>
+          <a:blip r:embed="rId2" cstate="print"/>
+          <a:stretch>
+            <a:fillRect/>
+          </a:stretch>
+        </p:blipFill>
+        <p:spPr>
+          <a:xfrm>
+            <a:off x="11117035" y="11809"/>
+            <a:ext cx="1074965" cy="1074965"/>
+          </a:xfrm>
+          <a:prstGeom prst="rect">
+            <a:avLst/>
+          </a:prstGeom>
+        </p:spPr>
+      </p:pic>
+      <p:sp>
+        <p:nvSpPr>
+          <p:cNvPr id="7" name="TextBox 6">
+            <a:extLst>
+              <a:ext uri="{FF2B5EF4-FFF2-40B4-BE49-F238E27FC236}">
+                <a16:creationId xmlns:a16="http://schemas.microsoft.com/office/drawing/2014/main" id="{223CB7BF-1D14-46EC-8E3E-24EFBDD1B9DB}"/>
+              </a:ext>
+            </a:extLst>
+          </p:cNvPr>
+          <p:cNvSpPr txBox="1"/>
+          <p:nvPr/>
+        </p:nvSpPr>
+        <p:spPr>
+          <a:xfrm>
+            <a:off x="0" y="6538912"/>
+            <a:ext cx="12192000" cy="369332"/>
+          </a:xfrm>
+          <a:prstGeom prst="rect">
+            <a:avLst/>
+          </a:prstGeom>
+          <a:solidFill>
+            <a:srgbClr val="002060"/>
+          </a:solidFill>
+        </p:spPr>
+        <p:txBody>
+          <a:bodyPr wrap="square" rtlCol="0">
+            <a:spAutoFit/>
+          </a:bodyPr>
+          <a:lstStyle/>
+          <a:p>
+            <a:r>
+              <a:rPr lang="en-IN" dirty="0">
+                <a:ln>
+                  <a:solidFill>
+                    <a:schemeClr val="bg1"/>
+                  </a:solidFill>
+                </a:ln>
+                <a:solidFill>
+                  <a:schemeClr val="bg1"/>
+                </a:solidFill>
+              </a:rPr>
+              <a:t>Dept. </a:t>
+            </a:r>
+            <a:r>
+              <a:rPr lang="en-IN">
+                <a:ln>
+                  <a:solidFill>
+                    <a:schemeClr val="bg1"/>
+                  </a:solidFill>
+                </a:ln>
+                <a:solidFill>
+                  <a:schemeClr val="bg1"/>
+                </a:solidFill>
+              </a:rPr>
+              <a:t>of CSE</a:t>
+            </a:r>
+            <a:r>
+              <a:rPr lang="en-IN" dirty="0">
+                <a:ln>
+                  <a:solidFill>
+                    <a:schemeClr val="bg1"/>
+                  </a:solidFill>
+                </a:ln>
+                <a:solidFill>
+                  <a:schemeClr val="bg1"/>
+                </a:solidFill>
+              </a:rPr>
+              <a:t>, SVIT                                                                                                                                                                                     </a:t>
+            </a:r>
+            <a:fld id="{A779D412-7551-4DA0-A19D-519BB8214474}" type="slidenum">
+              <a:rPr lang="en-IN" smtClean="0">
+                <a:ln>
+                  <a:solidFill>
+                    <a:schemeClr val="bg1"/>
+                  </a:solidFill>
+                </a:ln>
+                <a:solidFill>
+                  <a:schemeClr val="bg1"/>
+                </a:solidFill>
+              </a:rPr>
+              <a:pPr/>
+              <a:t>5</a:t>
+            </a:fld>
+            <a:endParaRPr lang="en-IN" dirty="0">
+              <a:ln>
+                <a:solidFill>
+                  <a:schemeClr val="bg1"/>
+                </a:solidFill>
+              </a:ln>
+              <a:solidFill>
+                <a:schemeClr val="bg1"/>
+              </a:solidFill>
+            </a:endParaRPr>
+          </a:p>
+        </p:txBody>
+      </p:sp>
+    </p:spTree>
+    <p:extLst>
+      <p:ext uri="{BB962C8B-B14F-4D97-AF65-F5344CB8AC3E}">
+        <p14:creationId xmlns:p14="http://schemas.microsoft.com/office/powerpoint/2010/main" val="4139920463"/>
+      </p:ext>
+    </p:extLst>
+  </p:cSld>
+  <p:clrMapOvr>
+    <a:masterClrMapping/>
+  </p:clrMapOvr>
+</p:sld>
+</file>
+
+<file path=ppt/slides/slide6.xml><?xml version="1.0" encoding="utf-8"?>
+<p:sld xmlns:a="http://schemas.openxmlformats.org/drawingml/2006/main" xmlns:r="http://schemas.openxmlformats.org/officeDocument/2006/relationships" xmlns:p="http://schemas.openxmlformats.org/presentationml/2006/main">
+  <p:cSld>
+    <p:spTree>
+      <p:nvGrpSpPr>
+        <p:cNvPr id="1" name=""/>
+        <p:cNvGrpSpPr/>
+        <p:nvPr/>
+      </p:nvGrpSpPr>
+      <p:grpSpPr>
+        <a:xfrm>
+          <a:off x="0" y="0"/>
+          <a:ext cx="0" cy="0"/>
+          <a:chOff x="0" y="0"/>
+          <a:chExt cx="0" cy="0"/>
+        </a:xfrm>
+      </p:grpSpPr>
+      <p:sp>
+        <p:nvSpPr>
+          <p:cNvPr id="2" name="Title 1">
+            <a:extLst>
+              <a:ext uri="{FF2B5EF4-FFF2-40B4-BE49-F238E27FC236}">
+                <a16:creationId xmlns:a16="http://schemas.microsoft.com/office/drawing/2014/main" id="{F82EF132-6DF6-4CA0-B333-B03D94DE9F9E}"/>
+              </a:ext>
+            </a:extLst>
+          </p:cNvPr>
+          <p:cNvSpPr>
+            <a:spLocks noGrp="1"/>
+          </p:cNvSpPr>
+          <p:nvPr>
+            <p:ph type="title"/>
+          </p:nvPr>
+        </p:nvSpPr>
+        <p:spPr>
+          <a:xfrm>
+            <a:off x="0" y="326571"/>
+            <a:ext cx="9879291" cy="760203"/>
+          </a:xfrm>
+          <a:solidFill>
+            <a:srgbClr val="002060"/>
+          </a:solidFill>
+        </p:spPr>
+        <p:txBody>
+          <a:bodyPr>
+            <a:normAutofit/>
+          </a:bodyPr>
+          <a:lstStyle/>
+          <a:p>
+            <a:r>
+              <a:rPr lang="en-IN" b="1" dirty="0">
+                <a:ln>
+                  <a:solidFill>
+                    <a:schemeClr val="bg1"/>
+                  </a:solidFill>
+                </a:ln>
+                <a:solidFill>
+                  <a:schemeClr val="bg1"/>
+                </a:solidFill>
+              </a:rPr>
+              <a:t>Snapshots</a:t>
+            </a:r>
+          </a:p>
+        </p:txBody>
+      </p:sp>
+      <p:pic>
+        <p:nvPicPr>
+          <p:cNvPr id="6" name="Picture 5">
+            <a:extLst>
+              <a:ext uri="{FF2B5EF4-FFF2-40B4-BE49-F238E27FC236}">
+                <a16:creationId xmlns:a16="http://schemas.microsoft.com/office/drawing/2014/main" id="{0C787187-C5D7-4EC8-AAA7-3E11DCB132B4}"/>
+              </a:ext>
+            </a:extLst>
+          </p:cNvPr>
+          <p:cNvPicPr>
+            <a:picLocks noChangeAspect="1"/>
+          </p:cNvPicPr>
+          <p:nvPr/>
+        </p:nvPicPr>
+        <p:blipFill>
+          <a:blip r:embed="rId2" cstate="print"/>
+          <a:stretch>
+            <a:fillRect/>
+          </a:stretch>
+        </p:blipFill>
+        <p:spPr>
+          <a:xfrm>
+            <a:off x="11117035" y="11809"/>
+            <a:ext cx="1074965" cy="1074965"/>
+          </a:xfrm>
+          <a:prstGeom prst="rect">
+            <a:avLst/>
+          </a:prstGeom>
+        </p:spPr>
+      </p:pic>
+      <p:sp>
+        <p:nvSpPr>
+          <p:cNvPr id="7" name="TextBox 6">
+            <a:extLst>
+              <a:ext uri="{FF2B5EF4-FFF2-40B4-BE49-F238E27FC236}">
+                <a16:creationId xmlns:a16="http://schemas.microsoft.com/office/drawing/2014/main" id="{223CB7BF-1D14-46EC-8E3E-24EFBDD1B9DB}"/>
+              </a:ext>
+            </a:extLst>
+          </p:cNvPr>
+          <p:cNvSpPr txBox="1"/>
+          <p:nvPr/>
+        </p:nvSpPr>
+        <p:spPr>
+          <a:xfrm>
+            <a:off x="0" y="6538912"/>
+            <a:ext cx="12192000" cy="369332"/>
+          </a:xfrm>
+          <a:prstGeom prst="rect">
+            <a:avLst/>
+          </a:prstGeom>
+          <a:solidFill>
+            <a:srgbClr val="002060"/>
+          </a:solidFill>
+        </p:spPr>
+        <p:txBody>
+          <a:bodyPr wrap="square" rtlCol="0">
+            <a:spAutoFit/>
+          </a:bodyPr>
+          <a:lstStyle/>
+          <a:p>
+            <a:r>
+              <a:rPr lang="en-IN" dirty="0">
+                <a:ln>
+                  <a:solidFill>
+                    <a:schemeClr val="bg1"/>
+                  </a:solidFill>
+                </a:ln>
+                <a:solidFill>
+                  <a:schemeClr val="bg1"/>
+                </a:solidFill>
+              </a:rPr>
+              <a:t>Dept. </a:t>
+            </a:r>
+            <a:r>
+              <a:rPr lang="en-IN">
+                <a:ln>
+                  <a:solidFill>
+                    <a:schemeClr val="bg1"/>
+                  </a:solidFill>
+                </a:ln>
+                <a:solidFill>
+                  <a:schemeClr val="bg1"/>
+                </a:solidFill>
+              </a:rPr>
+              <a:t>of CSE</a:t>
+            </a:r>
+            <a:r>
+              <a:rPr lang="en-IN" dirty="0">
+                <a:ln>
+                  <a:solidFill>
+                    <a:schemeClr val="bg1"/>
+                  </a:solidFill>
+                </a:ln>
+                <a:solidFill>
+                  <a:schemeClr val="bg1"/>
+                </a:solidFill>
+              </a:rPr>
+              <a:t>, SVIT                                                                                                                                                                                     </a:t>
+            </a:r>
+            <a:fld id="{A779D412-7551-4DA0-A19D-519BB8214474}" type="slidenum">
+              <a:rPr lang="en-IN" smtClean="0">
+                <a:ln>
+                  <a:solidFill>
+                    <a:schemeClr val="bg1"/>
+                  </a:solidFill>
+                </a:ln>
+                <a:solidFill>
+                  <a:schemeClr val="bg1"/>
+                </a:solidFill>
+              </a:rPr>
+              <a:pPr/>
+              <a:t>6</a:t>
+            </a:fld>
+            <a:endParaRPr lang="en-IN" dirty="0">
+              <a:ln>
+                <a:solidFill>
+                  <a:schemeClr val="bg1"/>
+                </a:solidFill>
+              </a:ln>
+              <a:solidFill>
+                <a:schemeClr val="bg1"/>
+              </a:solidFill>
+            </a:endParaRPr>
+          </a:p>
+        </p:txBody>
+      </p:sp>
+    </p:spTree>
+    <p:extLst>
+      <p:ext uri="{BB962C8B-B14F-4D97-AF65-F5344CB8AC3E}">
+        <p14:creationId xmlns:p14="http://schemas.microsoft.com/office/powerpoint/2010/main" val="4240431755"/>
+      </p:ext>
+    </p:extLst>
+  </p:cSld>
+  <p:clrMapOvr>
+    <a:masterClrMapping/>
+  </p:clrMapOvr>
+</p:sld>
+</file>
+
+<file path=ppt/slides/slide7.xml><?xml version="1.0" encoding="utf-8"?>
+<p:sld xmlns:a="http://schemas.openxmlformats.org/drawingml/2006/main" xmlns:r="http://schemas.openxmlformats.org/officeDocument/2006/relationships" xmlns:p="http://schemas.openxmlformats.org/presentationml/2006/main">
+  <p:cSld>
+    <p:spTree>
+      <p:nvGrpSpPr>
+        <p:cNvPr id="1" name=""/>
+        <p:cNvGrpSpPr/>
+        <p:nvPr/>
+      </p:nvGrpSpPr>
+      <p:grpSpPr>
+        <a:xfrm>
+          <a:off x="0" y="0"/>
+          <a:ext cx="0" cy="0"/>
+          <a:chOff x="0" y="0"/>
+          <a:chExt cx="0" cy="0"/>
+        </a:xfrm>
+      </p:grpSpPr>
+      <p:sp>
+        <p:nvSpPr>
+          <p:cNvPr id="2" name="Title 1">
+            <a:extLst>
+              <a:ext uri="{FF2B5EF4-FFF2-40B4-BE49-F238E27FC236}">
+                <a16:creationId xmlns:a16="http://schemas.microsoft.com/office/drawing/2014/main" id="{F82EF132-6DF6-4CA0-B333-B03D94DE9F9E}"/>
+              </a:ext>
+            </a:extLst>
+          </p:cNvPr>
+          <p:cNvSpPr>
+            <a:spLocks noGrp="1"/>
+          </p:cNvSpPr>
+          <p:nvPr>
+            <p:ph type="title"/>
+          </p:nvPr>
+        </p:nvSpPr>
+        <p:spPr>
+          <a:xfrm>
+            <a:off x="0" y="242577"/>
+            <a:ext cx="9879291" cy="844197"/>
+          </a:xfrm>
+          <a:solidFill>
+            <a:srgbClr val="002060"/>
+          </a:solidFill>
+        </p:spPr>
+        <p:txBody>
+          <a:bodyPr/>
+          <a:lstStyle/>
+          <a:p>
+            <a:r>
+              <a:rPr lang="en-IN" b="1" dirty="0">
+                <a:ln>
+                  <a:solidFill>
+                    <a:schemeClr val="bg1"/>
+                  </a:solidFill>
+                </a:ln>
+                <a:solidFill>
+                  <a:schemeClr val="bg1"/>
+                </a:solidFill>
+              </a:rPr>
+              <a:t>Conclusion</a:t>
+            </a:r>
+          </a:p>
+        </p:txBody>
+      </p:sp>
+      <p:pic>
+        <p:nvPicPr>
+          <p:cNvPr id="6" name="Picture 5">
+            <a:extLst>
+              <a:ext uri="{FF2B5EF4-FFF2-40B4-BE49-F238E27FC236}">
+                <a16:creationId xmlns:a16="http://schemas.microsoft.com/office/drawing/2014/main" id="{0C787187-C5D7-4EC8-AAA7-3E11DCB132B4}"/>
+              </a:ext>
+            </a:extLst>
+          </p:cNvPr>
+          <p:cNvPicPr>
+            <a:picLocks noChangeAspect="1"/>
+          </p:cNvPicPr>
+          <p:nvPr/>
+        </p:nvPicPr>
+        <p:blipFill>
+          <a:blip r:embed="rId2" cstate="print"/>
+          <a:stretch>
+            <a:fillRect/>
+          </a:stretch>
+        </p:blipFill>
+        <p:spPr>
+          <a:xfrm>
+            <a:off x="11117035" y="11809"/>
+            <a:ext cx="1074965" cy="1074965"/>
+          </a:xfrm>
+          <a:prstGeom prst="rect">
+            <a:avLst/>
+          </a:prstGeom>
+        </p:spPr>
+      </p:pic>
+      <p:sp>
+        <p:nvSpPr>
+          <p:cNvPr id="7" name="TextBox 6">
+            <a:extLst>
+              <a:ext uri="{FF2B5EF4-FFF2-40B4-BE49-F238E27FC236}">
+                <a16:creationId xmlns:a16="http://schemas.microsoft.com/office/drawing/2014/main" id="{223CB7BF-1D14-46EC-8E3E-24EFBDD1B9DB}"/>
+              </a:ext>
+            </a:extLst>
+          </p:cNvPr>
+          <p:cNvSpPr txBox="1"/>
+          <p:nvPr/>
+        </p:nvSpPr>
+        <p:spPr>
+          <a:xfrm>
+            <a:off x="0" y="6538912"/>
+            <a:ext cx="12192000" cy="369332"/>
+          </a:xfrm>
+          <a:prstGeom prst="rect">
+            <a:avLst/>
+          </a:prstGeom>
+          <a:solidFill>
+            <a:srgbClr val="002060"/>
+          </a:solidFill>
+        </p:spPr>
+        <p:txBody>
+          <a:bodyPr wrap="square" rtlCol="0">
+            <a:spAutoFit/>
+          </a:bodyPr>
+          <a:lstStyle/>
+          <a:p>
+            <a:r>
+              <a:rPr lang="en-IN" dirty="0">
+                <a:ln>
+                  <a:solidFill>
+                    <a:schemeClr val="bg1"/>
+                  </a:solidFill>
+                </a:ln>
+                <a:solidFill>
+                  <a:schemeClr val="bg1"/>
+                </a:solidFill>
+              </a:rPr>
+              <a:t>Dept. </a:t>
+            </a:r>
+            <a:r>
+              <a:rPr lang="en-IN">
+                <a:ln>
+                  <a:solidFill>
+                    <a:schemeClr val="bg1"/>
+                  </a:solidFill>
+                </a:ln>
+                <a:solidFill>
+                  <a:schemeClr val="bg1"/>
+                </a:solidFill>
+              </a:rPr>
+              <a:t>of CSE</a:t>
+            </a:r>
+            <a:r>
+              <a:rPr lang="en-IN" dirty="0">
+                <a:ln>
+                  <a:solidFill>
+                    <a:schemeClr val="bg1"/>
+                  </a:solidFill>
+                </a:ln>
+                <a:solidFill>
+                  <a:schemeClr val="bg1"/>
+                </a:solidFill>
+              </a:rPr>
+              <a:t>, SVIT                                                                                                                                                                                     </a:t>
+            </a:r>
+            <a:fld id="{A779D412-7551-4DA0-A19D-519BB8214474}" type="slidenum">
+              <a:rPr lang="en-IN" smtClean="0">
+                <a:ln>
+                  <a:solidFill>
+                    <a:schemeClr val="bg1"/>
+                  </a:solidFill>
+                </a:ln>
+                <a:solidFill>
+                  <a:schemeClr val="bg1"/>
+                </a:solidFill>
+              </a:rPr>
+              <a:pPr/>
+              <a:t>7</a:t>
+            </a:fld>
+            <a:endParaRPr lang="en-IN" dirty="0">
+              <a:ln>
+                <a:solidFill>
+                  <a:schemeClr val="bg1"/>
+                </a:solidFill>
+              </a:ln>
+              <a:solidFill>
+                <a:schemeClr val="bg1"/>
+              </a:solidFill>
+            </a:endParaRPr>
+          </a:p>
+        </p:txBody>
+      </p:sp>
+    </p:spTree>
+    <p:extLst>
+      <p:ext uri="{BB962C8B-B14F-4D97-AF65-F5344CB8AC3E}">
+        <p14:creationId xmlns:p14="http://schemas.microsoft.com/office/powerpoint/2010/main" val="2825789085"/>
+      </p:ext>
+    </p:extLst>
+  </p:cSld>
+  <p:clrMapOvr>
+    <a:masterClrMapping/>
+  </p:clrMapOvr>
+</p:sld>
+</file>
+
+<file path=ppt/slides/slide8.xml><?xml version="1.0" encoding="utf-8"?>
+<p:sld xmlns:a="http://schemas.openxmlformats.org/drawingml/2006/main" xmlns:r="http://schemas.openxmlformats.org/officeDocument/2006/relationships" xmlns:p="http://schemas.openxmlformats.org/presentationml/2006/main">
+  <p:cSld>
+    <p:spTree>
+      <p:nvGrpSpPr>
+        <p:cNvPr id="1" name=""/>
+        <p:cNvGrpSpPr/>
+        <p:nvPr/>
+      </p:nvGrpSpPr>
+      <p:grpSpPr>
+        <a:xfrm>
+          <a:off x="0" y="0"/>
+          <a:ext cx="0" cy="0"/>
+          <a:chOff x="0" y="0"/>
+          <a:chExt cx="0" cy="0"/>
+        </a:xfrm>
+      </p:grpSpPr>
+      <p:sp>
+        <p:nvSpPr>
+          <p:cNvPr id="2" name="Title 1">
+            <a:extLst>
+              <a:ext uri="{FF2B5EF4-FFF2-40B4-BE49-F238E27FC236}">
+                <a16:creationId xmlns:a16="http://schemas.microsoft.com/office/drawing/2014/main" id="{F82EF132-6DF6-4CA0-B333-B03D94DE9F9E}"/>
+              </a:ext>
+            </a:extLst>
+          </p:cNvPr>
+          <p:cNvSpPr>
+            <a:spLocks noGrp="1"/>
+          </p:cNvSpPr>
+          <p:nvPr>
+            <p:ph type="title"/>
+          </p:nvPr>
+        </p:nvSpPr>
+        <p:spPr>
+          <a:xfrm>
+            <a:off x="0" y="242577"/>
+            <a:ext cx="9879291" cy="844197"/>
+          </a:xfrm>
+          <a:solidFill>
+            <a:srgbClr val="002060"/>
+          </a:solidFill>
+        </p:spPr>
+        <p:txBody>
+          <a:bodyPr/>
+          <a:lstStyle/>
+          <a:p>
+            <a:r>
+              <a:rPr lang="en-IN" b="1" dirty="0">
+                <a:ln>
+                  <a:solidFill>
+                    <a:schemeClr val="bg1"/>
+                  </a:solidFill>
+                </a:ln>
+                <a:solidFill>
+                  <a:schemeClr val="bg1"/>
+                </a:solidFill>
+              </a:rPr>
+              <a:t>References</a:t>
+            </a:r>
+          </a:p>
+        </p:txBody>
+      </p:sp>
+      <p:pic>
+        <p:nvPicPr>
+          <p:cNvPr id="6" name="Picture 5">
+            <a:extLst>
+              <a:ext uri="{FF2B5EF4-FFF2-40B4-BE49-F238E27FC236}">
+                <a16:creationId xmlns:a16="http://schemas.microsoft.com/office/drawing/2014/main" id="{0C787187-C5D7-4EC8-AAA7-3E11DCB132B4}"/>
+              </a:ext>
+            </a:extLst>
+          </p:cNvPr>
+          <p:cNvPicPr>
+            <a:picLocks noChangeAspect="1"/>
+          </p:cNvPicPr>
+          <p:nvPr/>
+        </p:nvPicPr>
+        <p:blipFill>
+          <a:blip r:embed="rId2" cstate="print"/>
+          <a:stretch>
+            <a:fillRect/>
+          </a:stretch>
+        </p:blipFill>
+        <p:spPr>
+          <a:xfrm>
+            <a:off x="11117035" y="11809"/>
+            <a:ext cx="1074965" cy="1074965"/>
+          </a:xfrm>
+          <a:prstGeom prst="rect">
+            <a:avLst/>
+          </a:prstGeom>
+        </p:spPr>
+      </p:pic>
+      <p:sp>
+        <p:nvSpPr>
+          <p:cNvPr id="7" name="TextBox 6">
+            <a:extLst>
+              <a:ext uri="{FF2B5EF4-FFF2-40B4-BE49-F238E27FC236}">
+                <a16:creationId xmlns:a16="http://schemas.microsoft.com/office/drawing/2014/main" id="{223CB7BF-1D14-46EC-8E3E-24EFBDD1B9DB}"/>
+              </a:ext>
+            </a:extLst>
+          </p:cNvPr>
+          <p:cNvSpPr txBox="1"/>
+          <p:nvPr/>
+        </p:nvSpPr>
+        <p:spPr>
+          <a:xfrm>
+            <a:off x="0" y="6538912"/>
+            <a:ext cx="12192000" cy="369332"/>
+          </a:xfrm>
+          <a:prstGeom prst="rect">
+            <a:avLst/>
+          </a:prstGeom>
+          <a:solidFill>
+            <a:srgbClr val="002060"/>
+          </a:solidFill>
+        </p:spPr>
+        <p:txBody>
+          <a:bodyPr wrap="square" rtlCol="0">
+            <a:spAutoFit/>
+          </a:bodyPr>
+          <a:lstStyle/>
+          <a:p>
+            <a:r>
+              <a:rPr lang="en-IN" dirty="0">
+                <a:ln>
+                  <a:solidFill>
+                    <a:schemeClr val="bg1"/>
+                  </a:solidFill>
+                </a:ln>
+                <a:solidFill>
+                  <a:schemeClr val="bg1"/>
+                </a:solidFill>
+              </a:rPr>
+              <a:t>Dept. </a:t>
+            </a:r>
+            <a:r>
+              <a:rPr lang="en-IN">
+                <a:ln>
+                  <a:solidFill>
+                    <a:schemeClr val="bg1"/>
+                  </a:solidFill>
+                </a:ln>
+                <a:solidFill>
+                  <a:schemeClr val="bg1"/>
+                </a:solidFill>
+              </a:rPr>
+              <a:t>of CSE</a:t>
+            </a:r>
+            <a:r>
+              <a:rPr lang="en-IN" dirty="0">
+                <a:ln>
+                  <a:solidFill>
+                    <a:schemeClr val="bg1"/>
+                  </a:solidFill>
+                </a:ln>
+                <a:solidFill>
+                  <a:schemeClr val="bg1"/>
+                </a:solidFill>
+              </a:rPr>
+              <a:t>, SVIT                                                                                                                                                                                     </a:t>
+            </a:r>
+            <a:fld id="{A779D412-7551-4DA0-A19D-519BB8214474}" type="slidenum">
+              <a:rPr lang="en-IN" smtClean="0">
+                <a:ln>
+                  <a:solidFill>
+                    <a:schemeClr val="bg1"/>
+                  </a:solidFill>
+                </a:ln>
+                <a:solidFill>
+                  <a:schemeClr val="bg1"/>
+                </a:solidFill>
+              </a:rPr>
+              <a:pPr/>
+              <a:t>8</a:t>
+            </a:fld>
+            <a:endParaRPr lang="en-IN" dirty="0">
+              <a:ln>
+                <a:solidFill>
+                  <a:schemeClr val="bg1"/>
+                </a:solidFill>
+              </a:ln>
+              <a:solidFill>
+                <a:schemeClr val="bg1"/>
+              </a:solidFill>
+            </a:endParaRPr>
+          </a:p>
+        </p:txBody>
+      </p:sp>
+    </p:spTree>
+    <p:extLst>
+      <p:ext uri="{BB962C8B-B14F-4D97-AF65-F5344CB8AC3E}">
+        <p14:creationId xmlns:p14="http://schemas.microsoft.com/office/powerpoint/2010/main" val="1757412873"/>
       </p:ext>
     </p:extLst>
   </p:cSld>
@@ -4733,7 +5922,7 @@
   <a:extraClrSchemeLst/>
   <a:extLst>
     <a:ext uri="{05A4C25C-085E-4340-85A3-A5531E510DB2}">
-      <thm15:themeFamily xmlns:thm15="http://schemas.microsoft.com/office/thememl/2012/main" xmlns="" name="SAI VIDYA INSTITUTE OF TECHNOLOGY" id="{6E2E0BFB-66C5-439C-9215-787BD78E550D}" vid="{4BA40E75-3BD3-4897-98E8-5C67A832454F}"/>
+      <thm15:themeFamily xmlns:thm15="http://schemas.microsoft.com/office/thememl/2012/main" name="SAI VIDYA INSTITUTE OF TECHNOLOGY" id="{6E2E0BFB-66C5-439C-9215-787BD78E550D}" vid="{4BA40E75-3BD3-4897-98E8-5C67A832454F}"/>
     </a:ext>
   </a:extLst>
 </a:theme>
@@ -5028,7 +6217,7 @@
   <a:extraClrSchemeLst/>
   <a:extLst>
     <a:ext uri="{05A4C25C-085E-4340-85A3-A5531E510DB2}">
-      <thm15:themeFamily xmlns:thm15="http://schemas.microsoft.com/office/thememl/2012/main" xmlns="" name="Office Theme" id="{62F939B6-93AF-4DB8-9C6B-D6C7DFDC589F}" vid="{4A3C46E8-61CC-4603-A589-7422A47A8E4A}"/>
+      <thm15:themeFamily xmlns:thm15="http://schemas.microsoft.com/office/thememl/2012/main" name="Office Theme" id="{62F939B6-93AF-4DB8-9C6B-D6C7DFDC589F}" vid="{4A3C46E8-61CC-4603-A589-7422A47A8E4A}"/>
     </a:ext>
   </a:extLst>
 </a:theme>

</xml_diff>